<commit_message>
Atualizado o plano.pptx com variáveis das transportadoras e referências
</commit_message>
<xml_diff>
--- a/plano.pptx
+++ b/plano.pptx
@@ -9,7 +9,7 @@
     <p:sldId id="259" r:id="rId3"/>
     <p:sldId id="260" r:id="rId4"/>
     <p:sldId id="257" r:id="rId5"/>
-    <p:sldId id="258" r:id="rId6"/>
+    <p:sldId id="261" r:id="rId6"/>
   </p:sldIdLst>
   <p:sldSz cx="12192000" cy="6858000"/>
   <p:notesSz cx="6858000" cy="9144000"/>
@@ -941,21 +941,45 @@
           </a:br>
           <a:r>
             <a:rPr lang="pt-PT" sz="1400" dirty="0"/>
-            <a:t> - Localização: Torres Vedras, Alcácer do Sal, Campo Maior</a:t>
+            <a:t> - </a:t>
+          </a:r>
+          <a:r>
+            <a:rPr lang="pt-PT" sz="1400" b="1" dirty="0"/>
+            <a:t>Localização: </a:t>
+          </a:r>
+          <a:r>
+            <a:rPr lang="pt-PT" sz="1400" dirty="0"/>
+            <a:t>Torres Vedras, Alcácer do Sal, Campo Maior</a:t>
           </a:r>
           <a:br>
             <a:rPr lang="pt-PT" sz="1400" dirty="0"/>
           </a:br>
           <a:r>
             <a:rPr lang="pt-PT" sz="1400" dirty="0"/>
-            <a:t> - Recursos Consumidos: água, combustíveis</a:t>
+            <a:t> - </a:t>
+          </a:r>
+          <a:r>
+            <a:rPr lang="pt-PT" sz="1400" b="1" dirty="0"/>
+            <a:t>Recursos Consumidos: </a:t>
+          </a:r>
+          <a:r>
+            <a:rPr lang="pt-PT" sz="1400" dirty="0"/>
+            <a:t>água, combustíveis</a:t>
           </a:r>
           <a:br>
             <a:rPr lang="pt-PT" sz="1400" dirty="0"/>
           </a:br>
           <a:r>
             <a:rPr lang="pt-PT" sz="1400" dirty="0"/>
-            <a:t> - Poluição: desperdício, contaminações do solo, emissões de CO2</a:t>
+            <a:t> - </a:t>
+          </a:r>
+          <a:r>
+            <a:rPr lang="pt-PT" sz="1400" b="1" dirty="0"/>
+            <a:t>Poluição:</a:t>
+          </a:r>
+          <a:r>
+            <a:rPr lang="pt-PT" sz="1400" dirty="0"/>
+            <a:t> desperdício, contaminações do solo, emissões de CO2</a:t>
           </a:r>
         </a:p>
       </dgm:t>
@@ -1169,6 +1193,72 @@
         </a:p>
       </dgm:t>
     </dgm:pt>
+    <dgm:pt modelId="{B24F51BC-53CB-4101-AEB6-7BE88C9D62DE}">
+      <dgm:prSet phldrT="[Texto]" custT="1"/>
+      <dgm:spPr/>
+      <dgm:t>
+        <a:bodyPr/>
+        <a:lstStyle/>
+        <a:p>
+          <a:r>
+            <a:rPr lang="pt-PT" sz="1400" dirty="0"/>
+            <a:t>Variáveis:</a:t>
+          </a:r>
+          <a:br>
+            <a:rPr lang="pt-PT" sz="1400" dirty="0"/>
+          </a:br>
+          <a:r>
+            <a:rPr lang="pt-PT" sz="1400" dirty="0"/>
+            <a:t> - </a:t>
+          </a:r>
+          <a:r>
+            <a:rPr lang="pt-PT" sz="1400" b="1" dirty="0"/>
+            <a:t>Encomenda: </a:t>
+          </a:r>
+          <a:r>
+            <a:rPr lang="pt-PT" sz="1400" dirty="0"/>
+            <a:t>por produto e quantidades diferentes à escolha do consumidor</a:t>
+          </a:r>
+          <a:br>
+            <a:rPr lang="pt-PT" sz="1400" dirty="0"/>
+          </a:br>
+          <a:r>
+            <a:rPr lang="pt-PT" sz="1400" dirty="0"/>
+            <a:t> - </a:t>
+          </a:r>
+          <a:r>
+            <a:rPr lang="pt-PT" sz="1400" b="1" dirty="0"/>
+            <a:t>Histórico: </a:t>
+          </a:r>
+          <a:r>
+            <a:rPr lang="pt-PT" sz="1400" dirty="0"/>
+            <a:t>ser possível aceder ao histórico de recursos consumidos e poluição</a:t>
+          </a:r>
+        </a:p>
+      </dgm:t>
+    </dgm:pt>
+    <dgm:pt modelId="{A114A08F-54E4-4D97-9857-5EA481420D23}" type="parTrans" cxnId="{F38AB0BA-E4D3-420E-BF3E-EC29226AF746}">
+      <dgm:prSet/>
+      <dgm:spPr/>
+      <dgm:t>
+        <a:bodyPr/>
+        <a:lstStyle/>
+        <a:p>
+          <a:endParaRPr lang="pt-PT"/>
+        </a:p>
+      </dgm:t>
+    </dgm:pt>
+    <dgm:pt modelId="{B418A6AB-67BB-4C7E-B743-48E4D68DDEF1}" type="sibTrans" cxnId="{F38AB0BA-E4D3-420E-BF3E-EC29226AF746}">
+      <dgm:prSet/>
+      <dgm:spPr/>
+      <dgm:t>
+        <a:bodyPr/>
+        <a:lstStyle/>
+        <a:p>
+          <a:endParaRPr lang="pt-PT"/>
+        </a:p>
+      </dgm:t>
+    </dgm:pt>
     <dgm:pt modelId="{C39BA939-8DE2-423B-A9D7-B7A45FF6B7D1}">
       <dgm:prSet phldrT="[Texto]" custT="1"/>
       <dgm:spPr/>
@@ -1186,28 +1276,92 @@
           </a:br>
           <a:r>
             <a:rPr lang="pt-PT" sz="1400" dirty="0"/>
-            <a:t> - Recursos Consumidos: combustíveis</a:t>
+            <a:t> - </a:t>
+          </a:r>
+          <a:r>
+            <a:rPr lang="pt-PT" sz="1400" b="1" dirty="0" err="1"/>
+            <a:t>origem_percurso</a:t>
+          </a:r>
+          <a:r>
+            <a:rPr lang="pt-PT" sz="1400" b="1" dirty="0"/>
+            <a:t>: </a:t>
+          </a:r>
+          <a:r>
+            <a:rPr lang="pt-PT" sz="1400" dirty="0" err="1"/>
+            <a:t>string</a:t>
+          </a:r>
+          <a:r>
+            <a:rPr lang="pt-PT" sz="1400" dirty="0"/>
+            <a:t>. Recebe os nomes das localizações de origem (fornecedores) a partir do </a:t>
+          </a:r>
+          <a:r>
+            <a:rPr lang="pt-PT" sz="1400" dirty="0" err="1"/>
+            <a:t>csv</a:t>
+          </a:r>
+          <a:r>
+            <a:rPr lang="pt-PT" sz="1400" dirty="0"/>
+            <a:t>.</a:t>
           </a:r>
           <a:br>
             <a:rPr lang="pt-PT" sz="1400" dirty="0"/>
           </a:br>
           <a:r>
             <a:rPr lang="pt-PT" sz="1400" dirty="0"/>
-            <a:t> - Poluição: Emissões de CO2</a:t>
+            <a:t> </a:t>
+          </a:r>
+          <a:r>
+            <a:rPr lang="pt-PT" sz="1400" b="1" dirty="0"/>
+            <a:t>- transportadora: </a:t>
+          </a:r>
+          <a:r>
+            <a:rPr lang="pt-PT" sz="1400" dirty="0" err="1"/>
+            <a:t>string</a:t>
+          </a:r>
+          <a:r>
+            <a:rPr lang="pt-PT" sz="1400" dirty="0"/>
+            <a:t>. Recebe uma letra correspondente a cada transportadora.</a:t>
           </a:r>
           <a:br>
             <a:rPr lang="pt-PT" sz="1400" dirty="0"/>
           </a:br>
           <a:r>
             <a:rPr lang="pt-PT" sz="1400" dirty="0"/>
-            <a:t> - Localização: produção / Transportadora</a:t>
+            <a:t> </a:t>
+          </a:r>
+          <a:r>
+            <a:rPr lang="pt-PT" sz="1400" b="1" dirty="0"/>
+            <a:t>- chave: </a:t>
+          </a:r>
+          <a:r>
+            <a:rPr lang="pt-PT" sz="1400" dirty="0"/>
+            <a:t>combina a origem com a transportadora, para fazer a soma das pontuações.</a:t>
           </a:r>
           <a:br>
             <a:rPr lang="pt-PT" sz="1400" dirty="0"/>
           </a:br>
           <a:r>
             <a:rPr lang="pt-PT" sz="1400" dirty="0"/>
-            <a:t> - Destino: Colombo</a:t>
+            <a:t> </a:t>
+          </a:r>
+          <a:r>
+            <a:rPr lang="pt-PT" sz="1400" b="1" dirty="0"/>
+            <a:t>- </a:t>
+          </a:r>
+          <a:r>
+            <a:rPr lang="pt-PT" sz="1400" b="1" dirty="0" err="1"/>
+            <a:t>pontuação_total</a:t>
+          </a:r>
+          <a:r>
+            <a:rPr lang="pt-PT" sz="1400" b="1" dirty="0"/>
+            <a:t>: </a:t>
+          </a:r>
+          <a:r>
+            <a:rPr lang="pt-PT" sz="1400" dirty="0" err="1"/>
+            <a:t>int</a:t>
+          </a:r>
+          <a:r>
+            <a:rPr lang="pt-PT" sz="1400" dirty="0"/>
+            <a:t>. Soma pontuações do combustível e das emissões.</a:t>
           </a:r>
         </a:p>
       </dgm:t>
@@ -1271,35 +1425,44 @@
         </a:p>
       </dgm:t>
     </dgm:pt>
-    <dgm:pt modelId="{B24F51BC-53CB-4101-AEB6-7BE88C9D62DE}">
+    <dgm:pt modelId="{E86CF7B8-8162-4BBF-A876-4D711C53BB18}">
       <dgm:prSet phldrT="[Texto]" custT="1"/>
       <dgm:spPr/>
       <dgm:t>
         <a:bodyPr/>
         <a:lstStyle/>
         <a:p>
+          <a:pPr algn="l">
+            <a:buNone/>
+          </a:pPr>
           <a:r>
             <a:rPr lang="pt-PT" sz="1400" dirty="0"/>
-            <a:t>Variáveis:</a:t>
-          </a:r>
-          <a:br>
+            <a:t> </a:t>
+          </a:r>
+          <a:r>
+            <a:rPr lang="pt-PT" sz="1400" b="1" dirty="0"/>
+            <a:t>- </a:t>
+          </a:r>
+          <a:r>
+            <a:rPr lang="pt-PT" sz="1400" b="1" dirty="0" err="1"/>
+            <a:t>pontuacoes_por_transportadora_origem</a:t>
+          </a:r>
+          <a:r>
+            <a:rPr lang="pt-PT" sz="1400" b="1" dirty="0"/>
+            <a:t>: </a:t>
+          </a:r>
+          <a:r>
+            <a:rPr lang="pt-PT" sz="1400" dirty="0" err="1"/>
+            <a:t>int</a:t>
+          </a:r>
+          <a:r>
             <a:rPr lang="pt-PT" sz="1400" dirty="0"/>
-          </a:br>
-          <a:r>
-            <a:rPr lang="pt-PT" sz="1400" dirty="0"/>
-            <a:t> - Encomenda: por produto e quantidades diferentes à escolha do consumidor</a:t>
-          </a:r>
-          <a:br>
-            <a:rPr lang="pt-PT" sz="1400" dirty="0"/>
-          </a:br>
-          <a:r>
-            <a:rPr lang="pt-PT" sz="1400" dirty="0"/>
-            <a:t> - Histórico: ser possível aceder ao histórico de recursos consumidos e poluição</a:t>
+            <a:t>. Soma das pontuações por origem/transportadora.</a:t>
           </a:r>
         </a:p>
       </dgm:t>
     </dgm:pt>
-    <dgm:pt modelId="{A114A08F-54E4-4D97-9857-5EA481420D23}" type="parTrans" cxnId="{F38AB0BA-E4D3-420E-BF3E-EC29226AF746}">
+    <dgm:pt modelId="{8C660D90-C31F-485D-8336-508246229A20}" type="parTrans" cxnId="{ED2FEFC7-59BA-4ADA-B3FE-6C1E04E06C89}">
       <dgm:prSet/>
       <dgm:spPr/>
       <dgm:t>
@@ -1310,7 +1473,7 @@
         </a:p>
       </dgm:t>
     </dgm:pt>
-    <dgm:pt modelId="{B418A6AB-67BB-4C7E-B743-48E4D68DDEF1}" type="sibTrans" cxnId="{F38AB0BA-E4D3-420E-BF3E-EC29226AF746}">
+    <dgm:pt modelId="{C2AF744B-ADB4-4691-A573-417383D877B2}" type="sibTrans" cxnId="{ED2FEFC7-59BA-4ADA-B3FE-6C1E04E06C89}">
       <dgm:prSet/>
       <dgm:spPr/>
       <dgm:t>
@@ -1409,7 +1572,8 @@
     <dgm:cxn modelId="{C1B01119-575B-4110-8086-B9C49B57AB13}" type="presOf" srcId="{B24F51BC-53CB-4101-AEB6-7BE88C9D62DE}" destId="{AC41524F-BC99-4B73-9603-0D65538D0B49}" srcOrd="0" destOrd="1" presId="urn:microsoft.com/office/officeart/2005/8/layout/chevron2"/>
     <dgm:cxn modelId="{EE7B5119-CE07-4778-8E35-B112F98A65FF}" type="presOf" srcId="{C39BA939-8DE2-423B-A9D7-B7A45FF6B7D1}" destId="{0DAF73F2-2D5C-41B6-B961-A8025ADECEC2}" srcOrd="0" destOrd="1" presId="urn:microsoft.com/office/officeart/2005/8/layout/chevron2"/>
     <dgm:cxn modelId="{426F5A1D-A1AB-47F4-B293-EE3568338BC3}" type="presOf" srcId="{1FE66B43-1605-4FC2-87AC-0BCD2F85AA52}" destId="{AC41524F-BC99-4B73-9603-0D65538D0B49}" srcOrd="0" destOrd="0" presId="urn:microsoft.com/office/officeart/2005/8/layout/chevron2"/>
-    <dgm:cxn modelId="{71FD9D26-4DE7-4690-9DB1-E8E662F0FF52}" type="presOf" srcId="{E7BE5B4B-13DD-437A-B5FD-8F7535952419}" destId="{0DAF73F2-2D5C-41B6-B961-A8025ADECEC2}" srcOrd="0" destOrd="2" presId="urn:microsoft.com/office/officeart/2005/8/layout/chevron2"/>
+    <dgm:cxn modelId="{71FD9D26-4DE7-4690-9DB1-E8E662F0FF52}" type="presOf" srcId="{E7BE5B4B-13DD-437A-B5FD-8F7535952419}" destId="{0DAF73F2-2D5C-41B6-B961-A8025ADECEC2}" srcOrd="0" destOrd="3" presId="urn:microsoft.com/office/officeart/2005/8/layout/chevron2"/>
+    <dgm:cxn modelId="{B260EF2D-B22B-4698-B5AC-77601A801F00}" type="presOf" srcId="{E86CF7B8-8162-4BBF-A876-4D711C53BB18}" destId="{0DAF73F2-2D5C-41B6-B961-A8025ADECEC2}" srcOrd="0" destOrd="2" presId="urn:microsoft.com/office/officeart/2005/8/layout/chevron2"/>
     <dgm:cxn modelId="{F84C792F-934E-4053-9314-BC69BF91A0A4}" type="presOf" srcId="{C9802667-66A1-4F13-854F-5BD4F4E9C651}" destId="{6F50F605-F0EB-4CAA-9B51-B66F7954CADE}" srcOrd="0" destOrd="0" presId="urn:microsoft.com/office/officeart/2005/8/layout/chevron2"/>
     <dgm:cxn modelId="{AEC13431-4CF9-42C7-964F-B786140376E2}" type="presOf" srcId="{018347E8-E9CE-4CBF-AA53-C5049140A6FC}" destId="{725FFF58-D226-4B08-ACD9-683227C365F6}" srcOrd="0" destOrd="1" presId="urn:microsoft.com/office/officeart/2005/8/layout/chevron2"/>
     <dgm:cxn modelId="{7C5C8B5B-4452-4A01-A354-82966F60C507}" type="presOf" srcId="{3E2976AB-3793-475D-B71F-719A562998A5}" destId="{29D919F5-EB76-4EB6-931C-38B308E7579A}" srcOrd="0" destOrd="0" presId="urn:microsoft.com/office/officeart/2005/8/layout/chevron2"/>
@@ -1420,6 +1584,7 @@
     <dgm:cxn modelId="{F38AB0BA-E4D3-420E-BF3E-EC29226AF746}" srcId="{C9802667-66A1-4F13-854F-5BD4F4E9C651}" destId="{B24F51BC-53CB-4101-AEB6-7BE88C9D62DE}" srcOrd="1" destOrd="0" parTransId="{A114A08F-54E4-4D97-9857-5EA481420D23}" sibTransId="{B418A6AB-67BB-4C7E-B743-48E4D68DDEF1}"/>
     <dgm:cxn modelId="{82E452BE-5D0D-4D10-940D-5F157FCD1DE9}" type="presOf" srcId="{5A9F2CC6-A335-4940-B4BE-E69E50E1255A}" destId="{ED22B1C3-1A68-4FBE-8516-1D355421EC3A}" srcOrd="0" destOrd="0" presId="urn:microsoft.com/office/officeart/2005/8/layout/chevron2"/>
     <dgm:cxn modelId="{68A873C4-3B9E-4229-8390-B19B885B1D7D}" srcId="{5A9F2CC6-A335-4940-B4BE-E69E50E1255A}" destId="{75313886-4594-4155-8C77-F64E460F2EB3}" srcOrd="1" destOrd="0" parTransId="{69BA9C2E-F6CA-49C6-8F06-018DBED65CE3}" sibTransId="{ABECEC7A-5F8B-4A51-B79E-C5F0EDECCFB0}"/>
+    <dgm:cxn modelId="{ED2FEFC7-59BA-4ADA-B3FE-6C1E04E06C89}" srcId="{C39BA939-8DE2-423B-A9D7-B7A45FF6B7D1}" destId="{E86CF7B8-8162-4BBF-A876-4D711C53BB18}" srcOrd="0" destOrd="0" parTransId="{8C660D90-C31F-485D-8336-508246229A20}" sibTransId="{C2AF744B-ADB4-4691-A573-417383D877B2}"/>
     <dgm:cxn modelId="{7ECD1BCA-6ADE-48AF-8F7B-158EBC751FA5}" type="presOf" srcId="{52E7779C-ADB3-487B-BFCE-F2540F80BFC1}" destId="{0DAF73F2-2D5C-41B6-B961-A8025ADECEC2}" srcOrd="0" destOrd="0" presId="urn:microsoft.com/office/officeart/2005/8/layout/chevron2"/>
     <dgm:cxn modelId="{6BE0BDDC-EB9A-4C0B-83EA-B165ABE35041}" type="presOf" srcId="{FBFA948C-D19F-41F9-9313-9C9874071F09}" destId="{725FFF58-D226-4B08-ACD9-683227C365F6}" srcOrd="0" destOrd="0" presId="urn:microsoft.com/office/officeart/2005/8/layout/chevron2"/>
     <dgm:cxn modelId="{BE4FCEE4-65C0-4C93-A1FA-87936D9D70A0}" srcId="{5A9F2CC6-A335-4940-B4BE-E69E50E1255A}" destId="{C9802667-66A1-4F13-854F-5BD4F4E9C651}" srcOrd="2" destOrd="0" parTransId="{67D3C84B-D703-4693-9FE7-A63E64B27597}" sibTransId="{0997528A-4582-4804-8C07-73797AEB2E8B}"/>
@@ -1608,21 +1773,45 @@
           </a:br>
           <a:r>
             <a:rPr lang="pt-PT" sz="1400" kern="1200" dirty="0"/>
-            <a:t> - Localização: Torres Vedras, Alcácer do Sal, Campo Maior</a:t>
+            <a:t> - </a:t>
+          </a:r>
+          <a:r>
+            <a:rPr lang="pt-PT" sz="1400" b="1" kern="1200" dirty="0"/>
+            <a:t>Localização: </a:t>
+          </a:r>
+          <a:r>
+            <a:rPr lang="pt-PT" sz="1400" kern="1200" dirty="0"/>
+            <a:t>Torres Vedras, Alcácer do Sal, Campo Maior</a:t>
           </a:r>
           <a:br>
             <a:rPr lang="pt-PT" sz="1400" kern="1200" dirty="0"/>
           </a:br>
           <a:r>
             <a:rPr lang="pt-PT" sz="1400" kern="1200" dirty="0"/>
-            <a:t> - Recursos Consumidos: água, combustíveis</a:t>
+            <a:t> - </a:t>
+          </a:r>
+          <a:r>
+            <a:rPr lang="pt-PT" sz="1400" b="1" kern="1200" dirty="0"/>
+            <a:t>Recursos Consumidos: </a:t>
+          </a:r>
+          <a:r>
+            <a:rPr lang="pt-PT" sz="1400" kern="1200" dirty="0"/>
+            <a:t>água, combustíveis</a:t>
           </a:r>
           <a:br>
             <a:rPr lang="pt-PT" sz="1400" kern="1200" dirty="0"/>
           </a:br>
           <a:r>
             <a:rPr lang="pt-PT" sz="1400" kern="1200" dirty="0"/>
-            <a:t> - Poluição: desperdício, contaminações do solo, emissões de CO2</a:t>
+            <a:t> - </a:t>
+          </a:r>
+          <a:r>
+            <a:rPr lang="pt-PT" sz="1400" b="1" kern="1200" dirty="0"/>
+            <a:t>Poluição:</a:t>
+          </a:r>
+          <a:r>
+            <a:rPr lang="pt-PT" sz="1400" kern="1200" dirty="0"/>
+            <a:t> desperdício, contaminações do solo, emissões de CO2</a:t>
           </a:r>
         </a:p>
         <a:p>
@@ -1820,28 +2009,130 @@
           </a:br>
           <a:r>
             <a:rPr lang="pt-PT" sz="1400" kern="1200" dirty="0"/>
-            <a:t> - Recursos Consumidos: combustíveis</a:t>
+            <a:t> - </a:t>
+          </a:r>
+          <a:r>
+            <a:rPr lang="pt-PT" sz="1400" b="1" kern="1200" dirty="0" err="1"/>
+            <a:t>origem_percurso</a:t>
+          </a:r>
+          <a:r>
+            <a:rPr lang="pt-PT" sz="1400" b="1" kern="1200" dirty="0"/>
+            <a:t>: </a:t>
+          </a:r>
+          <a:r>
+            <a:rPr lang="pt-PT" sz="1400" kern="1200" dirty="0" err="1"/>
+            <a:t>string</a:t>
+          </a:r>
+          <a:r>
+            <a:rPr lang="pt-PT" sz="1400" kern="1200" dirty="0"/>
+            <a:t>. Recebe os nomes das localizações de origem (fornecedores) a partir do </a:t>
+          </a:r>
+          <a:r>
+            <a:rPr lang="pt-PT" sz="1400" kern="1200" dirty="0" err="1"/>
+            <a:t>csv</a:t>
+          </a:r>
+          <a:r>
+            <a:rPr lang="pt-PT" sz="1400" kern="1200" dirty="0"/>
+            <a:t>.</a:t>
           </a:r>
           <a:br>
             <a:rPr lang="pt-PT" sz="1400" kern="1200" dirty="0"/>
           </a:br>
           <a:r>
             <a:rPr lang="pt-PT" sz="1400" kern="1200" dirty="0"/>
-            <a:t> - Poluição: Emissões de CO2</a:t>
+            <a:t> </a:t>
+          </a:r>
+          <a:r>
+            <a:rPr lang="pt-PT" sz="1400" b="1" kern="1200" dirty="0"/>
+            <a:t>- transportadora: </a:t>
+          </a:r>
+          <a:r>
+            <a:rPr lang="pt-PT" sz="1400" kern="1200" dirty="0" err="1"/>
+            <a:t>string</a:t>
+          </a:r>
+          <a:r>
+            <a:rPr lang="pt-PT" sz="1400" kern="1200" dirty="0"/>
+            <a:t>. Recebe uma letra correspondente a cada transportadora.</a:t>
           </a:r>
           <a:br>
             <a:rPr lang="pt-PT" sz="1400" kern="1200" dirty="0"/>
           </a:br>
           <a:r>
             <a:rPr lang="pt-PT" sz="1400" kern="1200" dirty="0"/>
-            <a:t> - Localização: produção / Transportadora</a:t>
+            <a:t> </a:t>
+          </a:r>
+          <a:r>
+            <a:rPr lang="pt-PT" sz="1400" b="1" kern="1200" dirty="0"/>
+            <a:t>- chave: </a:t>
+          </a:r>
+          <a:r>
+            <a:rPr lang="pt-PT" sz="1400" kern="1200" dirty="0"/>
+            <a:t>combina a origem com a transportadora, para fazer a soma das pontuações.</a:t>
           </a:r>
           <a:br>
             <a:rPr lang="pt-PT" sz="1400" kern="1200" dirty="0"/>
           </a:br>
           <a:r>
             <a:rPr lang="pt-PT" sz="1400" kern="1200" dirty="0"/>
-            <a:t> - Destino: Colombo</a:t>
+            <a:t> </a:t>
+          </a:r>
+          <a:r>
+            <a:rPr lang="pt-PT" sz="1400" b="1" kern="1200" dirty="0"/>
+            <a:t>- </a:t>
+          </a:r>
+          <a:r>
+            <a:rPr lang="pt-PT" sz="1400" b="1" kern="1200" dirty="0" err="1"/>
+            <a:t>pontuação_total</a:t>
+          </a:r>
+          <a:r>
+            <a:rPr lang="pt-PT" sz="1400" b="1" kern="1200" dirty="0"/>
+            <a:t>: </a:t>
+          </a:r>
+          <a:r>
+            <a:rPr lang="pt-PT" sz="1400" kern="1200" dirty="0" err="1"/>
+            <a:t>int</a:t>
+          </a:r>
+          <a:r>
+            <a:rPr lang="pt-PT" sz="1400" kern="1200" dirty="0"/>
+            <a:t>. Soma pontuações do combustível e das emissões.</a:t>
+          </a:r>
+        </a:p>
+        <a:p>
+          <a:pPr marL="228600" lvl="2" indent="-114300" algn="l" defTabSz="622300">
+            <a:lnSpc>
+              <a:spcPct val="90000"/>
+            </a:lnSpc>
+            <a:spcBef>
+              <a:spcPct val="0"/>
+            </a:spcBef>
+            <a:spcAft>
+              <a:spcPct val="15000"/>
+            </a:spcAft>
+            <a:buNone/>
+          </a:pPr>
+          <a:r>
+            <a:rPr lang="pt-PT" sz="1400" kern="1200" dirty="0"/>
+            <a:t> </a:t>
+          </a:r>
+          <a:r>
+            <a:rPr lang="pt-PT" sz="1400" b="1" kern="1200" dirty="0"/>
+            <a:t>- </a:t>
+          </a:r>
+          <a:r>
+            <a:rPr lang="pt-PT" sz="1400" b="1" kern="1200" dirty="0" err="1"/>
+            <a:t>pontuacoes_por_transportadora_origem</a:t>
+          </a:r>
+          <a:r>
+            <a:rPr lang="pt-PT" sz="1400" b="1" kern="1200" dirty="0"/>
+            <a:t>: </a:t>
+          </a:r>
+          <a:r>
+            <a:rPr lang="pt-PT" sz="1400" kern="1200" dirty="0" err="1"/>
+            <a:t>int</a:t>
+          </a:r>
+          <a:r>
+            <a:rPr lang="pt-PT" sz="1400" kern="1200" dirty="0"/>
+            <a:t>. Soma das pontuações por origem/transportadora.</a:t>
           </a:r>
         </a:p>
         <a:p>
@@ -2057,14 +2348,30 @@
           </a:br>
           <a:r>
             <a:rPr lang="pt-PT" sz="1400" kern="1200" dirty="0"/>
-            <a:t> - Encomenda: por produto e quantidades diferentes à escolha do consumidor</a:t>
+            <a:t> - </a:t>
+          </a:r>
+          <a:r>
+            <a:rPr lang="pt-PT" sz="1400" b="1" kern="1200" dirty="0"/>
+            <a:t>Encomenda: </a:t>
+          </a:r>
+          <a:r>
+            <a:rPr lang="pt-PT" sz="1400" kern="1200" dirty="0"/>
+            <a:t>por produto e quantidades diferentes à escolha do consumidor</a:t>
           </a:r>
           <a:br>
             <a:rPr lang="pt-PT" sz="1400" kern="1200" dirty="0"/>
           </a:br>
           <a:r>
             <a:rPr lang="pt-PT" sz="1400" kern="1200" dirty="0"/>
-            <a:t> - Histórico: ser possível aceder ao histórico de recursos consumidos e poluição</a:t>
+            <a:t> - </a:t>
+          </a:r>
+          <a:r>
+            <a:rPr lang="pt-PT" sz="1400" b="1" kern="1200" dirty="0"/>
+            <a:t>Histórico: </a:t>
+          </a:r>
+          <a:r>
+            <a:rPr lang="pt-PT" sz="1400" kern="1200" dirty="0"/>
+            <a:t>ser possível aceder ao histórico de recursos consumidos e poluição</a:t>
           </a:r>
         </a:p>
       </dsp:txBody>
@@ -3514,7 +3821,7 @@
           <a:p>
             <a:fld id="{D6AFFFE6-4672-49D7-AF2D-526308249928}" type="datetimeFigureOut">
               <a:rPr lang="pt-PT" smtClean="0"/>
-              <a:t>06/03/2025</a:t>
+              <a:t>09/03/2025</a:t>
             </a:fld>
             <a:endParaRPr lang="pt-PT"/>
           </a:p>
@@ -3712,7 +4019,7 @@
           <a:p>
             <a:fld id="{D6AFFFE6-4672-49D7-AF2D-526308249928}" type="datetimeFigureOut">
               <a:rPr lang="pt-PT" smtClean="0"/>
-              <a:t>06/03/2025</a:t>
+              <a:t>09/03/2025</a:t>
             </a:fld>
             <a:endParaRPr lang="pt-PT"/>
           </a:p>
@@ -3920,7 +4227,7 @@
           <a:p>
             <a:fld id="{D6AFFFE6-4672-49D7-AF2D-526308249928}" type="datetimeFigureOut">
               <a:rPr lang="pt-PT" smtClean="0"/>
-              <a:t>06/03/2025</a:t>
+              <a:t>09/03/2025</a:t>
             </a:fld>
             <a:endParaRPr lang="pt-PT"/>
           </a:p>
@@ -4118,7 +4425,7 @@
           <a:p>
             <a:fld id="{D6AFFFE6-4672-49D7-AF2D-526308249928}" type="datetimeFigureOut">
               <a:rPr lang="pt-PT" smtClean="0"/>
-              <a:t>06/03/2025</a:t>
+              <a:t>09/03/2025</a:t>
             </a:fld>
             <a:endParaRPr lang="pt-PT"/>
           </a:p>
@@ -4393,7 +4700,7 @@
           <a:p>
             <a:fld id="{D6AFFFE6-4672-49D7-AF2D-526308249928}" type="datetimeFigureOut">
               <a:rPr lang="pt-PT" smtClean="0"/>
-              <a:t>06/03/2025</a:t>
+              <a:t>09/03/2025</a:t>
             </a:fld>
             <a:endParaRPr lang="pt-PT"/>
           </a:p>
@@ -4658,7 +4965,7 @@
           <a:p>
             <a:fld id="{D6AFFFE6-4672-49D7-AF2D-526308249928}" type="datetimeFigureOut">
               <a:rPr lang="pt-PT" smtClean="0"/>
-              <a:t>06/03/2025</a:t>
+              <a:t>09/03/2025</a:t>
             </a:fld>
             <a:endParaRPr lang="pt-PT"/>
           </a:p>
@@ -5070,7 +5377,7 @@
           <a:p>
             <a:fld id="{D6AFFFE6-4672-49D7-AF2D-526308249928}" type="datetimeFigureOut">
               <a:rPr lang="pt-PT" smtClean="0"/>
-              <a:t>06/03/2025</a:t>
+              <a:t>09/03/2025</a:t>
             </a:fld>
             <a:endParaRPr lang="pt-PT"/>
           </a:p>
@@ -5211,7 +5518,7 @@
           <a:p>
             <a:fld id="{D6AFFFE6-4672-49D7-AF2D-526308249928}" type="datetimeFigureOut">
               <a:rPr lang="pt-PT" smtClean="0"/>
-              <a:t>06/03/2025</a:t>
+              <a:t>09/03/2025</a:t>
             </a:fld>
             <a:endParaRPr lang="pt-PT"/>
           </a:p>
@@ -5324,7 +5631,7 @@
           <a:p>
             <a:fld id="{D6AFFFE6-4672-49D7-AF2D-526308249928}" type="datetimeFigureOut">
               <a:rPr lang="pt-PT" smtClean="0"/>
-              <a:t>06/03/2025</a:t>
+              <a:t>09/03/2025</a:t>
             </a:fld>
             <a:endParaRPr lang="pt-PT"/>
           </a:p>
@@ -5635,7 +5942,7 @@
           <a:p>
             <a:fld id="{D6AFFFE6-4672-49D7-AF2D-526308249928}" type="datetimeFigureOut">
               <a:rPr lang="pt-PT" smtClean="0"/>
-              <a:t>06/03/2025</a:t>
+              <a:t>09/03/2025</a:t>
             </a:fld>
             <a:endParaRPr lang="pt-PT"/>
           </a:p>
@@ -5923,7 +6230,7 @@
           <a:p>
             <a:fld id="{D6AFFFE6-4672-49D7-AF2D-526308249928}" type="datetimeFigureOut">
               <a:rPr lang="pt-PT" smtClean="0"/>
-              <a:t>06/03/2025</a:t>
+              <a:t>09/03/2025</a:t>
             </a:fld>
             <a:endParaRPr lang="pt-PT"/>
           </a:p>
@@ -6164,7 +6471,7 @@
           <a:p>
             <a:fld id="{D6AFFFE6-4672-49D7-AF2D-526308249928}" type="datetimeFigureOut">
               <a:rPr lang="pt-PT" smtClean="0"/>
-              <a:t>06/03/2025</a:t>
+              <a:t>09/03/2025</a:t>
             </a:fld>
             <a:endParaRPr lang="pt-PT"/>
           </a:p>
@@ -9023,7 +9330,7 @@
           <p:nvPr>
             <p:extLst>
               <p:ext uri="{D42A27DB-BD31-4B8C-83A1-F6EECF244321}">
-                <p14:modId xmlns:p14="http://schemas.microsoft.com/office/powerpoint/2010/main" val="3295123048"/>
+                <p14:modId xmlns:p14="http://schemas.microsoft.com/office/powerpoint/2010/main" val="3351416922"/>
               </p:ext>
             </p:extLst>
           </p:nvPr>
@@ -9092,7 +9399,13 @@
   <p:cSld>
     <p:spTree>
       <p:nvGrpSpPr>
-        <p:cNvPr id="1" name=""/>
+        <p:cNvPr id="1" name="">
+          <a:extLst>
+            <a:ext uri="{FF2B5EF4-FFF2-40B4-BE49-F238E27FC236}">
+              <a16:creationId xmlns:a16="http://schemas.microsoft.com/office/drawing/2014/main" id="{CA7DDCAF-CE4A-18AE-BC1A-AD6CF06E6C31}"/>
+            </a:ext>
+          </a:extLst>
+        </p:cNvPr>
         <p:cNvGrpSpPr/>
         <p:nvPr/>
       </p:nvGrpSpPr>
@@ -9109,7 +9422,7 @@
           <p:cNvPr id="4" name="CaixaDeTexto 3">
             <a:extLst>
               <a:ext uri="{FF2B5EF4-FFF2-40B4-BE49-F238E27FC236}">
-                <a16:creationId xmlns:a16="http://schemas.microsoft.com/office/drawing/2014/main" id="{3ECEB6D3-67FC-454B-9C83-95126096B8F7}"/>
+                <a16:creationId xmlns:a16="http://schemas.microsoft.com/office/drawing/2014/main" id="{6DE20A09-26A5-7CA8-D623-601F976167C7}"/>
               </a:ext>
             </a:extLst>
           </p:cNvPr>
@@ -9145,7 +9458,7 @@
           <p:cNvPr id="6" name="CaixaDeTexto 5">
             <a:extLst>
               <a:ext uri="{FF2B5EF4-FFF2-40B4-BE49-F238E27FC236}">
-                <a16:creationId xmlns:a16="http://schemas.microsoft.com/office/drawing/2014/main" id="{6E3F8FD3-4682-48BE-940C-DCA4FCB958BC}"/>
+                <a16:creationId xmlns:a16="http://schemas.microsoft.com/office/drawing/2014/main" id="{D83880DB-C597-5C07-5965-7B77FC047F38}"/>
               </a:ext>
             </a:extLst>
           </p:cNvPr>
@@ -9154,8 +9467,8 @@
         </p:nvSpPr>
         <p:spPr>
           <a:xfrm>
-            <a:off x="1617214" y="1951672"/>
-            <a:ext cx="8957569" cy="1477328"/>
+            <a:off x="641445" y="1112160"/>
+            <a:ext cx="10904561" cy="5678478"/>
           </a:xfrm>
           <a:prstGeom prst="rect">
             <a:avLst/>
@@ -9168,32 +9481,322 @@
           </a:bodyPr>
           <a:lstStyle/>
           <a:p>
-            <a:r>
-              <a:rPr lang="pt-PT" dirty="0"/>
-              <a:t>- </a:t>
-            </a:r>
-            <a:r>
-              <a:rPr lang="pt-PT" dirty="0">
+            <a:pPr marL="285750" indent="-285750">
+              <a:buFontTx/>
+              <a:buChar char="-"/>
+            </a:pPr>
+            <a:r>
+              <a:rPr lang="pt-PT" sz="1700" dirty="0" err="1"/>
+              <a:t>Supply</a:t>
+            </a:r>
+            <a:r>
+              <a:rPr lang="pt-PT" sz="1700" dirty="0"/>
+              <a:t> </a:t>
+            </a:r>
+            <a:r>
+              <a:rPr lang="pt-PT" sz="1700" dirty="0" err="1"/>
+              <a:t>Chain</a:t>
+            </a:r>
+            <a:r>
+              <a:rPr lang="pt-PT" sz="1700" dirty="0"/>
+              <a:t> </a:t>
+            </a:r>
+            <a:r>
+              <a:rPr lang="pt-PT" sz="1700" dirty="0" err="1"/>
+              <a:t>Sustainability</a:t>
+            </a:r>
+            <a:r>
+              <a:rPr lang="pt-PT" sz="1700" dirty="0"/>
+              <a:t>: </a:t>
+            </a:r>
+            <a:r>
+              <a:rPr lang="pt-PT" sz="1700" dirty="0">
                 <a:hlinkClick r:id="rId2"/>
               </a:rPr>
               <a:t>https://github.com/samirsaci/supply-chain-sustainability?tab=readme-ov-file</a:t>
             </a:r>
             <a:r>
-              <a:rPr lang="pt-PT" dirty="0"/>
-              <a:t> 05/03/2025</a:t>
-            </a:r>
-          </a:p>
-          <a:p>
-            <a:r>
-              <a:rPr lang="pt-PT" dirty="0"/>
-              <a:t>-</a:t>
-            </a:r>
-          </a:p>
-          <a:p>
-            <a:r>
-              <a:rPr lang="pt-PT" dirty="0"/>
-              <a:t>-</a:t>
-            </a:r>
+              <a:rPr lang="pt-PT" sz="1700" dirty="0"/>
+              <a:t> | 05/03/2024</a:t>
+            </a:r>
+          </a:p>
+          <a:p>
+            <a:pPr marL="285750" indent="-285750">
+              <a:buFontTx/>
+              <a:buChar char="-"/>
+            </a:pPr>
+            <a:r>
+              <a:rPr lang="pt-PT" sz="1700" dirty="0" err="1"/>
+              <a:t>Combustiveis</a:t>
+            </a:r>
+            <a:r>
+              <a:rPr lang="pt-PT" sz="1700" dirty="0"/>
+              <a:t>: </a:t>
+            </a:r>
+            <a:r>
+              <a:rPr lang="pt-PT" sz="1700" dirty="0">
+                <a:hlinkClick r:id="rId3"/>
+              </a:rPr>
+              <a:t>https://www.agriscitech.eu/wp-content/uploads/2021/03/7_AST_1_March_2021.pdf</a:t>
+            </a:r>
+            <a:r>
+              <a:rPr lang="pt-PT" sz="1700" dirty="0"/>
+              <a:t> | 06/03/2025</a:t>
+            </a:r>
+          </a:p>
+          <a:p>
+            <a:pPr marL="285750" indent="-285750">
+              <a:buFontTx/>
+              <a:buChar char="-"/>
+            </a:pPr>
+            <a:r>
+              <a:rPr lang="pt-PT" sz="1700" dirty="0"/>
+              <a:t>Poluição do solo: </a:t>
+            </a:r>
+            <a:r>
+              <a:rPr lang="pt-PT" sz="1700" dirty="0">
+                <a:hlinkClick r:id="rId4"/>
+              </a:rPr>
+              <a:t>https://www.pjoes.com/pdf-87554-21413?filename=21413.pdf</a:t>
+            </a:r>
+            <a:r>
+              <a:rPr lang="pt-PT" sz="1700" dirty="0"/>
+              <a:t> | 06/03/2025</a:t>
+            </a:r>
+          </a:p>
+          <a:p>
+            <a:pPr marL="285750" indent="-285750">
+              <a:buFontTx/>
+              <a:buChar char="-"/>
+            </a:pPr>
+            <a:r>
+              <a:rPr lang="pt-PT" sz="1700" dirty="0"/>
+              <a:t>C02: </a:t>
+            </a:r>
+            <a:r>
+              <a:rPr lang="pt-PT" sz="1700" dirty="0">
+                <a:hlinkClick r:id="rId5"/>
+              </a:rPr>
+              <a:t>https://www.sciencedirect.com/science/article/pii/S0269749112003600</a:t>
+            </a:r>
+            <a:r>
+              <a:rPr lang="pt-PT" sz="1700" dirty="0"/>
+              <a:t> | 06/03/2025</a:t>
+            </a:r>
+          </a:p>
+          <a:p>
+            <a:pPr marL="285750" indent="-285750">
+              <a:buFontTx/>
+              <a:buChar char="-"/>
+            </a:pPr>
+            <a:r>
+              <a:rPr lang="pt-PT" sz="1700" dirty="0"/>
+              <a:t>Agua: </a:t>
+            </a:r>
+            <a:r>
+              <a:rPr lang="pt-PT" sz="1700" dirty="0">
+                <a:hlinkClick r:id="rId6"/>
+              </a:rPr>
+              <a:t>https://www.nature.com/articles/s41597-024-03051-3</a:t>
+            </a:r>
+            <a:r>
+              <a:rPr lang="pt-PT" sz="1700" dirty="0"/>
+              <a:t> | 06/03/2025</a:t>
+            </a:r>
+          </a:p>
+          <a:p>
+            <a:pPr marL="285750" indent="-285750">
+              <a:buFontTx/>
+              <a:buChar char="-"/>
+            </a:pPr>
+            <a:r>
+              <a:rPr lang="pt-PT" sz="1700" dirty="0"/>
+              <a:t>Desperdício alimentar: </a:t>
+            </a:r>
+            <a:r>
+              <a:rPr lang="pt-PT" sz="1700" dirty="0">
+                <a:hlinkClick r:id="rId7"/>
+              </a:rPr>
+              <a:t>https://publications.jrc.ec.europa.eu/repository/handle/JRC96121</a:t>
+            </a:r>
+            <a:r>
+              <a:rPr lang="pt-PT" sz="1700" dirty="0"/>
+              <a:t> | 06/03/2025</a:t>
+            </a:r>
+          </a:p>
+          <a:p>
+            <a:pPr marL="285750" indent="-285750">
+              <a:buFontTx/>
+              <a:buChar char="-"/>
+            </a:pPr>
+            <a:r>
+              <a:rPr lang="pt-PT" sz="1700" dirty="0"/>
+              <a:t>Eletricidade: enunciado  | 06/03/2025</a:t>
+            </a:r>
+          </a:p>
+          <a:p>
+            <a:pPr marL="285750" indent="-285750">
+              <a:buFontTx/>
+              <a:buChar char="-"/>
+            </a:pPr>
+            <a:r>
+              <a:rPr lang="pt-PT" sz="1700" dirty="0"/>
+              <a:t>Contaminação do solo: </a:t>
+            </a:r>
+            <a:r>
+              <a:rPr lang="pt-PT" sz="1700" dirty="0">
+                <a:hlinkClick r:id="rId4"/>
+              </a:rPr>
+              <a:t>https://www.pjoes.com/pdf-87554-21413?filename=21413.pdf</a:t>
+            </a:r>
+            <a:r>
+              <a:rPr lang="pt-PT" sz="1700" dirty="0"/>
+              <a:t> | 06/03/2025</a:t>
+            </a:r>
+          </a:p>
+          <a:p>
+            <a:pPr marL="285750" indent="-285750">
+              <a:buFontTx/>
+              <a:buChar char="-"/>
+            </a:pPr>
+            <a:r>
+              <a:rPr lang="pt-PT" sz="1700" dirty="0"/>
+              <a:t>Consumo Combustível Camiões: </a:t>
+            </a:r>
+            <a:r>
+              <a:rPr lang="pt-PT" sz="1700" dirty="0">
+                <a:hlinkClick r:id="rId8"/>
+              </a:rPr>
+              <a:t>https://prologapp.com/blog/consumo-de-combustivel-de-caminhoes/</a:t>
+            </a:r>
+            <a:r>
+              <a:rPr lang="pt-PT" sz="1700" dirty="0"/>
+              <a:t> | 07/03/2025</a:t>
+            </a:r>
+          </a:p>
+          <a:p>
+            <a:pPr marL="285750" indent="-285750">
+              <a:buFontTx/>
+              <a:buChar char="-"/>
+            </a:pPr>
+            <a:r>
+              <a:rPr lang="pt-PT" sz="1700" dirty="0"/>
+              <a:t>Transporte de Mercadorias: </a:t>
+            </a:r>
+            <a:r>
+              <a:rPr lang="pt-PT" sz="1700" dirty="0">
+                <a:hlinkClick r:id="rId9"/>
+              </a:rPr>
+              <a:t>https://rea.apambiente.pt/content/transporte-de-mercadorias</a:t>
+            </a:r>
+            <a:r>
+              <a:rPr lang="pt-PT" sz="1700" dirty="0"/>
+              <a:t> | 07/03/2025</a:t>
+            </a:r>
+          </a:p>
+          <a:p>
+            <a:pPr marL="285750" indent="-285750">
+              <a:buFontTx/>
+              <a:buChar char="-"/>
+            </a:pPr>
+            <a:r>
+              <a:rPr lang="pt-PT" sz="1700" dirty="0"/>
+              <a:t>Preço dos Combustíveis: </a:t>
+            </a:r>
+            <a:r>
+              <a:rPr lang="pt-PT" sz="1700" dirty="0">
+                <a:hlinkClick r:id="rId10"/>
+              </a:rPr>
+              <a:t>https://precoscombustiveis.dgeg.gov.pt/estatistica/preco-medio-diario/</a:t>
+            </a:r>
+            <a:r>
+              <a:rPr lang="pt-PT" sz="1700" dirty="0"/>
+              <a:t> | 07/03/2025</a:t>
+            </a:r>
+          </a:p>
+          <a:p>
+            <a:pPr marL="285750" indent="-285750">
+              <a:buFontTx/>
+              <a:buChar char="-"/>
+            </a:pPr>
+            <a:r>
+              <a:rPr lang="pt-PT" sz="1700" dirty="0"/>
+              <a:t>Consumo CO2: </a:t>
+            </a:r>
+            <a:r>
+              <a:rPr lang="pt-PT" sz="1700" dirty="0">
+                <a:hlinkClick r:id="rId11"/>
+              </a:rPr>
+              <a:t>https://gasogenio.com/pt/blog/emissoes-de-co2-por-tipo-de-combustivel/</a:t>
+            </a:r>
+            <a:r>
+              <a:rPr lang="pt-PT" sz="1700" dirty="0"/>
+              <a:t> | 07/03/2025</a:t>
+            </a:r>
+          </a:p>
+          <a:p>
+            <a:pPr marL="285750" indent="-285750">
+              <a:buFontTx/>
+              <a:buChar char="-"/>
+            </a:pPr>
+            <a:r>
+              <a:rPr lang="pt-PT" sz="1700" dirty="0" err="1"/>
+              <a:t>Logistics</a:t>
+            </a:r>
+            <a:r>
+              <a:rPr lang="pt-PT" sz="1700" dirty="0"/>
+              <a:t> </a:t>
+            </a:r>
+            <a:r>
+              <a:rPr lang="pt-PT" sz="1700" dirty="0" err="1"/>
+              <a:t>Operations</a:t>
+            </a:r>
+            <a:r>
+              <a:rPr lang="pt-PT" sz="1700" dirty="0"/>
+              <a:t> </a:t>
+            </a:r>
+            <a:r>
+              <a:rPr lang="pt-PT" sz="1700" dirty="0" err="1"/>
+              <a:t>and</a:t>
+            </a:r>
+            <a:r>
+              <a:rPr lang="pt-PT" sz="1700" dirty="0"/>
+              <a:t> Management: </a:t>
+            </a:r>
+            <a:r>
+              <a:rPr lang="pt-PT" sz="1700" dirty="0">
+                <a:hlinkClick r:id="rId12"/>
+              </a:rPr>
+              <a:t>https://ftp.idu.ac.id/wp-content/uploads/ebook/ip/LOGISTIK%20OPERASI/epdf.pub_logistics-operations-and-management-concepts-and-m.pdf</a:t>
+            </a:r>
+            <a:r>
+              <a:rPr lang="pt-PT" sz="1700" dirty="0"/>
+              <a:t> | 07/03/2025</a:t>
+            </a:r>
+          </a:p>
+          <a:p>
+            <a:pPr marL="285750" indent="-285750">
+              <a:buFontTx/>
+              <a:buChar char="-"/>
+            </a:pPr>
+            <a:endParaRPr lang="pt-PT" dirty="0"/>
+          </a:p>
+          <a:p>
+            <a:pPr marL="285750" indent="-285750">
+              <a:buFontTx/>
+              <a:buChar char="-"/>
+            </a:pPr>
+            <a:endParaRPr lang="pt-PT" dirty="0"/>
+          </a:p>
+          <a:p>
+            <a:pPr marL="285750" indent="-285750">
+              <a:buFontTx/>
+              <a:buChar char="-"/>
+            </a:pPr>
+            <a:endParaRPr lang="pt-PT" dirty="0"/>
+          </a:p>
+          <a:p>
+            <a:endParaRPr lang="pt-PT" dirty="0"/>
           </a:p>
           <a:p>
             <a:endParaRPr lang="pt-PT" dirty="0"/>
@@ -9206,7 +9809,7 @@
     </p:spTree>
     <p:extLst>
       <p:ext uri="{BB962C8B-B14F-4D97-AF65-F5344CB8AC3E}">
-        <p14:creationId xmlns:p14="http://schemas.microsoft.com/office/powerpoint/2010/main" val="1023581901"/>
+        <p14:creationId xmlns:p14="http://schemas.microsoft.com/office/powerpoint/2010/main" val="2597916564"/>
       </p:ext>
     </p:extLst>
   </p:cSld>

</xml_diff>

<commit_message>
Atualização do plano.pptx no ramo referências
</commit_message>
<xml_diff>
--- a/plano.pptx
+++ b/plano.pptx
@@ -9,7 +9,7 @@
     <p:sldId id="259" r:id="rId3"/>
     <p:sldId id="260" r:id="rId4"/>
     <p:sldId id="257" r:id="rId5"/>
-    <p:sldId id="258" r:id="rId6"/>
+    <p:sldId id="261" r:id="rId6"/>
   </p:sldIdLst>
   <p:sldSz cx="12192000" cy="6858000"/>
   <p:notesSz cx="6858000" cy="9144000"/>
@@ -941,21 +941,45 @@
           </a:br>
           <a:r>
             <a:rPr lang="pt-PT" sz="1400" dirty="0"/>
-            <a:t> - Localização: Torres Vedras, Alcácer do Sal, Campo Maior</a:t>
+            <a:t> - </a:t>
+          </a:r>
+          <a:r>
+            <a:rPr lang="pt-PT" sz="1400" b="1" dirty="0"/>
+            <a:t>Localização: </a:t>
+          </a:r>
+          <a:r>
+            <a:rPr lang="pt-PT" sz="1400" dirty="0"/>
+            <a:t>Torres Vedras, Alcácer do Sal, Campo Maior</a:t>
           </a:r>
           <a:br>
             <a:rPr lang="pt-PT" sz="1400" dirty="0"/>
           </a:br>
           <a:r>
             <a:rPr lang="pt-PT" sz="1400" dirty="0"/>
-            <a:t> - Recursos Consumidos: água, combustíveis</a:t>
+            <a:t> - </a:t>
+          </a:r>
+          <a:r>
+            <a:rPr lang="pt-PT" sz="1400" b="1" dirty="0"/>
+            <a:t>Recursos Consumidos: </a:t>
+          </a:r>
+          <a:r>
+            <a:rPr lang="pt-PT" sz="1400" dirty="0"/>
+            <a:t>água, combustíveis</a:t>
           </a:r>
           <a:br>
             <a:rPr lang="pt-PT" sz="1400" dirty="0"/>
           </a:br>
           <a:r>
             <a:rPr lang="pt-PT" sz="1400" dirty="0"/>
-            <a:t> - Poluição: desperdício, contaminações do solo, emissões de CO2</a:t>
+            <a:t> - </a:t>
+          </a:r>
+          <a:r>
+            <a:rPr lang="pt-PT" sz="1400" b="1" dirty="0"/>
+            <a:t>Poluição:</a:t>
+          </a:r>
+          <a:r>
+            <a:rPr lang="pt-PT" sz="1400" dirty="0"/>
+            <a:t> desperdício, contaminações do solo, emissões de CO2</a:t>
           </a:r>
         </a:p>
       </dgm:t>
@@ -1169,6 +1193,72 @@
         </a:p>
       </dgm:t>
     </dgm:pt>
+    <dgm:pt modelId="{B24F51BC-53CB-4101-AEB6-7BE88C9D62DE}">
+      <dgm:prSet phldrT="[Texto]" custT="1"/>
+      <dgm:spPr/>
+      <dgm:t>
+        <a:bodyPr/>
+        <a:lstStyle/>
+        <a:p>
+          <a:r>
+            <a:rPr lang="pt-PT" sz="1400" dirty="0"/>
+            <a:t>Variáveis:</a:t>
+          </a:r>
+          <a:br>
+            <a:rPr lang="pt-PT" sz="1400" dirty="0"/>
+          </a:br>
+          <a:r>
+            <a:rPr lang="pt-PT" sz="1400" dirty="0"/>
+            <a:t> - </a:t>
+          </a:r>
+          <a:r>
+            <a:rPr lang="pt-PT" sz="1400" b="1" dirty="0"/>
+            <a:t>Encomenda: </a:t>
+          </a:r>
+          <a:r>
+            <a:rPr lang="pt-PT" sz="1400" dirty="0"/>
+            <a:t>por produto e quantidades diferentes à escolha do consumidor</a:t>
+          </a:r>
+          <a:br>
+            <a:rPr lang="pt-PT" sz="1400" dirty="0"/>
+          </a:br>
+          <a:r>
+            <a:rPr lang="pt-PT" sz="1400" dirty="0"/>
+            <a:t> - </a:t>
+          </a:r>
+          <a:r>
+            <a:rPr lang="pt-PT" sz="1400" b="1" dirty="0"/>
+            <a:t>Histórico: </a:t>
+          </a:r>
+          <a:r>
+            <a:rPr lang="pt-PT" sz="1400" dirty="0"/>
+            <a:t>ser possível aceder ao histórico de recursos consumidos e poluição</a:t>
+          </a:r>
+        </a:p>
+      </dgm:t>
+    </dgm:pt>
+    <dgm:pt modelId="{A114A08F-54E4-4D97-9857-5EA481420D23}" type="parTrans" cxnId="{F38AB0BA-E4D3-420E-BF3E-EC29226AF746}">
+      <dgm:prSet/>
+      <dgm:spPr/>
+      <dgm:t>
+        <a:bodyPr/>
+        <a:lstStyle/>
+        <a:p>
+          <a:endParaRPr lang="pt-PT"/>
+        </a:p>
+      </dgm:t>
+    </dgm:pt>
+    <dgm:pt modelId="{B418A6AB-67BB-4C7E-B743-48E4D68DDEF1}" type="sibTrans" cxnId="{F38AB0BA-E4D3-420E-BF3E-EC29226AF746}">
+      <dgm:prSet/>
+      <dgm:spPr/>
+      <dgm:t>
+        <a:bodyPr/>
+        <a:lstStyle/>
+        <a:p>
+          <a:endParaRPr lang="pt-PT"/>
+        </a:p>
+      </dgm:t>
+    </dgm:pt>
     <dgm:pt modelId="{C39BA939-8DE2-423B-A9D7-B7A45FF6B7D1}">
       <dgm:prSet phldrT="[Texto]" custT="1"/>
       <dgm:spPr/>
@@ -1186,28 +1276,92 @@
           </a:br>
           <a:r>
             <a:rPr lang="pt-PT" sz="1400" dirty="0"/>
-            <a:t> - Recursos Consumidos: combustíveis</a:t>
+            <a:t> - </a:t>
+          </a:r>
+          <a:r>
+            <a:rPr lang="pt-PT" sz="1400" b="1" dirty="0" err="1"/>
+            <a:t>origem_percurso</a:t>
+          </a:r>
+          <a:r>
+            <a:rPr lang="pt-PT" sz="1400" b="1" dirty="0"/>
+            <a:t>: </a:t>
+          </a:r>
+          <a:r>
+            <a:rPr lang="pt-PT" sz="1400" dirty="0" err="1"/>
+            <a:t>string</a:t>
+          </a:r>
+          <a:r>
+            <a:rPr lang="pt-PT" sz="1400" dirty="0"/>
+            <a:t>. Recebe os nomes das localizações de origem (fornecedores) a partir do </a:t>
+          </a:r>
+          <a:r>
+            <a:rPr lang="pt-PT" sz="1400" dirty="0" err="1"/>
+            <a:t>csv</a:t>
+          </a:r>
+          <a:r>
+            <a:rPr lang="pt-PT" sz="1400" dirty="0"/>
+            <a:t>.</a:t>
           </a:r>
           <a:br>
             <a:rPr lang="pt-PT" sz="1400" dirty="0"/>
           </a:br>
           <a:r>
             <a:rPr lang="pt-PT" sz="1400" dirty="0"/>
-            <a:t> - Poluição: Emissões de CO2</a:t>
+            <a:t> </a:t>
+          </a:r>
+          <a:r>
+            <a:rPr lang="pt-PT" sz="1400" b="1" dirty="0"/>
+            <a:t>- transportadora: </a:t>
+          </a:r>
+          <a:r>
+            <a:rPr lang="pt-PT" sz="1400" dirty="0" err="1"/>
+            <a:t>string</a:t>
+          </a:r>
+          <a:r>
+            <a:rPr lang="pt-PT" sz="1400" dirty="0"/>
+            <a:t>. Recebe uma letra correspondente a cada transportadora.</a:t>
           </a:r>
           <a:br>
             <a:rPr lang="pt-PT" sz="1400" dirty="0"/>
           </a:br>
           <a:r>
             <a:rPr lang="pt-PT" sz="1400" dirty="0"/>
-            <a:t> - Localização: produção / Transportadora</a:t>
+            <a:t> </a:t>
+          </a:r>
+          <a:r>
+            <a:rPr lang="pt-PT" sz="1400" b="1" dirty="0"/>
+            <a:t>- chave: </a:t>
+          </a:r>
+          <a:r>
+            <a:rPr lang="pt-PT" sz="1400" dirty="0"/>
+            <a:t>combina a origem com a transportadora, para fazer a soma das pontuações.</a:t>
           </a:r>
           <a:br>
             <a:rPr lang="pt-PT" sz="1400" dirty="0"/>
           </a:br>
           <a:r>
             <a:rPr lang="pt-PT" sz="1400" dirty="0"/>
-            <a:t> - Destino: Colombo</a:t>
+            <a:t> </a:t>
+          </a:r>
+          <a:r>
+            <a:rPr lang="pt-PT" sz="1400" b="1" dirty="0"/>
+            <a:t>- </a:t>
+          </a:r>
+          <a:r>
+            <a:rPr lang="pt-PT" sz="1400" b="1" dirty="0" err="1"/>
+            <a:t>pontuação_total</a:t>
+          </a:r>
+          <a:r>
+            <a:rPr lang="pt-PT" sz="1400" b="1" dirty="0"/>
+            <a:t>: </a:t>
+          </a:r>
+          <a:r>
+            <a:rPr lang="pt-PT" sz="1400" dirty="0" err="1"/>
+            <a:t>int</a:t>
+          </a:r>
+          <a:r>
+            <a:rPr lang="pt-PT" sz="1400" dirty="0"/>
+            <a:t>. Soma pontuações do combustível e das emissões.</a:t>
           </a:r>
         </a:p>
       </dgm:t>
@@ -1271,35 +1425,44 @@
         </a:p>
       </dgm:t>
     </dgm:pt>
-    <dgm:pt modelId="{B24F51BC-53CB-4101-AEB6-7BE88C9D62DE}">
+    <dgm:pt modelId="{E86CF7B8-8162-4BBF-A876-4D711C53BB18}">
       <dgm:prSet phldrT="[Texto]" custT="1"/>
       <dgm:spPr/>
       <dgm:t>
         <a:bodyPr/>
         <a:lstStyle/>
         <a:p>
+          <a:pPr algn="l">
+            <a:buNone/>
+          </a:pPr>
           <a:r>
             <a:rPr lang="pt-PT" sz="1400" dirty="0"/>
-            <a:t>Variáveis:</a:t>
-          </a:r>
-          <a:br>
+            <a:t> </a:t>
+          </a:r>
+          <a:r>
+            <a:rPr lang="pt-PT" sz="1400" b="1" dirty="0"/>
+            <a:t>- </a:t>
+          </a:r>
+          <a:r>
+            <a:rPr lang="pt-PT" sz="1400" b="1" dirty="0" err="1"/>
+            <a:t>pontuacoes_por_transportadora_origem</a:t>
+          </a:r>
+          <a:r>
+            <a:rPr lang="pt-PT" sz="1400" b="1" dirty="0"/>
+            <a:t>: </a:t>
+          </a:r>
+          <a:r>
+            <a:rPr lang="pt-PT" sz="1400" dirty="0" err="1"/>
+            <a:t>int</a:t>
+          </a:r>
+          <a:r>
             <a:rPr lang="pt-PT" sz="1400" dirty="0"/>
-          </a:br>
-          <a:r>
-            <a:rPr lang="pt-PT" sz="1400" dirty="0"/>
-            <a:t> - Encomenda: por produto e quantidades diferentes à escolha do consumidor</a:t>
-          </a:r>
-          <a:br>
-            <a:rPr lang="pt-PT" sz="1400" dirty="0"/>
-          </a:br>
-          <a:r>
-            <a:rPr lang="pt-PT" sz="1400" dirty="0"/>
-            <a:t> - Histórico: ser possível aceder ao histórico de recursos consumidos e poluição</a:t>
+            <a:t>. Soma das pontuações por origem/transportadora.</a:t>
           </a:r>
         </a:p>
       </dgm:t>
     </dgm:pt>
-    <dgm:pt modelId="{A114A08F-54E4-4D97-9857-5EA481420D23}" type="parTrans" cxnId="{F38AB0BA-E4D3-420E-BF3E-EC29226AF746}">
+    <dgm:pt modelId="{8C660D90-C31F-485D-8336-508246229A20}" type="parTrans" cxnId="{ED2FEFC7-59BA-4ADA-B3FE-6C1E04E06C89}">
       <dgm:prSet/>
       <dgm:spPr/>
       <dgm:t>
@@ -1310,7 +1473,7 @@
         </a:p>
       </dgm:t>
     </dgm:pt>
-    <dgm:pt modelId="{B418A6AB-67BB-4C7E-B743-48E4D68DDEF1}" type="sibTrans" cxnId="{F38AB0BA-E4D3-420E-BF3E-EC29226AF746}">
+    <dgm:pt modelId="{C2AF744B-ADB4-4691-A573-417383D877B2}" type="sibTrans" cxnId="{ED2FEFC7-59BA-4ADA-B3FE-6C1E04E06C89}">
       <dgm:prSet/>
       <dgm:spPr/>
       <dgm:t>
@@ -1409,7 +1572,8 @@
     <dgm:cxn modelId="{C1B01119-575B-4110-8086-B9C49B57AB13}" type="presOf" srcId="{B24F51BC-53CB-4101-AEB6-7BE88C9D62DE}" destId="{AC41524F-BC99-4B73-9603-0D65538D0B49}" srcOrd="0" destOrd="1" presId="urn:microsoft.com/office/officeart/2005/8/layout/chevron2"/>
     <dgm:cxn modelId="{EE7B5119-CE07-4778-8E35-B112F98A65FF}" type="presOf" srcId="{C39BA939-8DE2-423B-A9D7-B7A45FF6B7D1}" destId="{0DAF73F2-2D5C-41B6-B961-A8025ADECEC2}" srcOrd="0" destOrd="1" presId="urn:microsoft.com/office/officeart/2005/8/layout/chevron2"/>
     <dgm:cxn modelId="{426F5A1D-A1AB-47F4-B293-EE3568338BC3}" type="presOf" srcId="{1FE66B43-1605-4FC2-87AC-0BCD2F85AA52}" destId="{AC41524F-BC99-4B73-9603-0D65538D0B49}" srcOrd="0" destOrd="0" presId="urn:microsoft.com/office/officeart/2005/8/layout/chevron2"/>
-    <dgm:cxn modelId="{71FD9D26-4DE7-4690-9DB1-E8E662F0FF52}" type="presOf" srcId="{E7BE5B4B-13DD-437A-B5FD-8F7535952419}" destId="{0DAF73F2-2D5C-41B6-B961-A8025ADECEC2}" srcOrd="0" destOrd="2" presId="urn:microsoft.com/office/officeart/2005/8/layout/chevron2"/>
+    <dgm:cxn modelId="{71FD9D26-4DE7-4690-9DB1-E8E662F0FF52}" type="presOf" srcId="{E7BE5B4B-13DD-437A-B5FD-8F7535952419}" destId="{0DAF73F2-2D5C-41B6-B961-A8025ADECEC2}" srcOrd="0" destOrd="3" presId="urn:microsoft.com/office/officeart/2005/8/layout/chevron2"/>
+    <dgm:cxn modelId="{B260EF2D-B22B-4698-B5AC-77601A801F00}" type="presOf" srcId="{E86CF7B8-8162-4BBF-A876-4D711C53BB18}" destId="{0DAF73F2-2D5C-41B6-B961-A8025ADECEC2}" srcOrd="0" destOrd="2" presId="urn:microsoft.com/office/officeart/2005/8/layout/chevron2"/>
     <dgm:cxn modelId="{F84C792F-934E-4053-9314-BC69BF91A0A4}" type="presOf" srcId="{C9802667-66A1-4F13-854F-5BD4F4E9C651}" destId="{6F50F605-F0EB-4CAA-9B51-B66F7954CADE}" srcOrd="0" destOrd="0" presId="urn:microsoft.com/office/officeart/2005/8/layout/chevron2"/>
     <dgm:cxn modelId="{AEC13431-4CF9-42C7-964F-B786140376E2}" type="presOf" srcId="{018347E8-E9CE-4CBF-AA53-C5049140A6FC}" destId="{725FFF58-D226-4B08-ACD9-683227C365F6}" srcOrd="0" destOrd="1" presId="urn:microsoft.com/office/officeart/2005/8/layout/chevron2"/>
     <dgm:cxn modelId="{7C5C8B5B-4452-4A01-A354-82966F60C507}" type="presOf" srcId="{3E2976AB-3793-475D-B71F-719A562998A5}" destId="{29D919F5-EB76-4EB6-931C-38B308E7579A}" srcOrd="0" destOrd="0" presId="urn:microsoft.com/office/officeart/2005/8/layout/chevron2"/>
@@ -1420,6 +1584,7 @@
     <dgm:cxn modelId="{F38AB0BA-E4D3-420E-BF3E-EC29226AF746}" srcId="{C9802667-66A1-4F13-854F-5BD4F4E9C651}" destId="{B24F51BC-53CB-4101-AEB6-7BE88C9D62DE}" srcOrd="1" destOrd="0" parTransId="{A114A08F-54E4-4D97-9857-5EA481420D23}" sibTransId="{B418A6AB-67BB-4C7E-B743-48E4D68DDEF1}"/>
     <dgm:cxn modelId="{82E452BE-5D0D-4D10-940D-5F157FCD1DE9}" type="presOf" srcId="{5A9F2CC6-A335-4940-B4BE-E69E50E1255A}" destId="{ED22B1C3-1A68-4FBE-8516-1D355421EC3A}" srcOrd="0" destOrd="0" presId="urn:microsoft.com/office/officeart/2005/8/layout/chevron2"/>
     <dgm:cxn modelId="{68A873C4-3B9E-4229-8390-B19B885B1D7D}" srcId="{5A9F2CC6-A335-4940-B4BE-E69E50E1255A}" destId="{75313886-4594-4155-8C77-F64E460F2EB3}" srcOrd="1" destOrd="0" parTransId="{69BA9C2E-F6CA-49C6-8F06-018DBED65CE3}" sibTransId="{ABECEC7A-5F8B-4A51-B79E-C5F0EDECCFB0}"/>
+    <dgm:cxn modelId="{ED2FEFC7-59BA-4ADA-B3FE-6C1E04E06C89}" srcId="{C39BA939-8DE2-423B-A9D7-B7A45FF6B7D1}" destId="{E86CF7B8-8162-4BBF-A876-4D711C53BB18}" srcOrd="0" destOrd="0" parTransId="{8C660D90-C31F-485D-8336-508246229A20}" sibTransId="{C2AF744B-ADB4-4691-A573-417383D877B2}"/>
     <dgm:cxn modelId="{7ECD1BCA-6ADE-48AF-8F7B-158EBC751FA5}" type="presOf" srcId="{52E7779C-ADB3-487B-BFCE-F2540F80BFC1}" destId="{0DAF73F2-2D5C-41B6-B961-A8025ADECEC2}" srcOrd="0" destOrd="0" presId="urn:microsoft.com/office/officeart/2005/8/layout/chevron2"/>
     <dgm:cxn modelId="{6BE0BDDC-EB9A-4C0B-83EA-B165ABE35041}" type="presOf" srcId="{FBFA948C-D19F-41F9-9313-9C9874071F09}" destId="{725FFF58-D226-4B08-ACD9-683227C365F6}" srcOrd="0" destOrd="0" presId="urn:microsoft.com/office/officeart/2005/8/layout/chevron2"/>
     <dgm:cxn modelId="{BE4FCEE4-65C0-4C93-A1FA-87936D9D70A0}" srcId="{5A9F2CC6-A335-4940-B4BE-E69E50E1255A}" destId="{C9802667-66A1-4F13-854F-5BD4F4E9C651}" srcOrd="2" destOrd="0" parTransId="{67D3C84B-D703-4693-9FE7-A63E64B27597}" sibTransId="{0997528A-4582-4804-8C07-73797AEB2E8B}"/>
@@ -1608,21 +1773,45 @@
           </a:br>
           <a:r>
             <a:rPr lang="pt-PT" sz="1400" kern="1200" dirty="0"/>
-            <a:t> - Localização: Torres Vedras, Alcácer do Sal, Campo Maior</a:t>
+            <a:t> - </a:t>
+          </a:r>
+          <a:r>
+            <a:rPr lang="pt-PT" sz="1400" b="1" kern="1200" dirty="0"/>
+            <a:t>Localização: </a:t>
+          </a:r>
+          <a:r>
+            <a:rPr lang="pt-PT" sz="1400" kern="1200" dirty="0"/>
+            <a:t>Torres Vedras, Alcácer do Sal, Campo Maior</a:t>
           </a:r>
           <a:br>
             <a:rPr lang="pt-PT" sz="1400" kern="1200" dirty="0"/>
           </a:br>
           <a:r>
             <a:rPr lang="pt-PT" sz="1400" kern="1200" dirty="0"/>
-            <a:t> - Recursos Consumidos: água, combustíveis</a:t>
+            <a:t> - </a:t>
+          </a:r>
+          <a:r>
+            <a:rPr lang="pt-PT" sz="1400" b="1" kern="1200" dirty="0"/>
+            <a:t>Recursos Consumidos: </a:t>
+          </a:r>
+          <a:r>
+            <a:rPr lang="pt-PT" sz="1400" kern="1200" dirty="0"/>
+            <a:t>água, combustíveis</a:t>
           </a:r>
           <a:br>
             <a:rPr lang="pt-PT" sz="1400" kern="1200" dirty="0"/>
           </a:br>
           <a:r>
             <a:rPr lang="pt-PT" sz="1400" kern="1200" dirty="0"/>
-            <a:t> - Poluição: desperdício, contaminações do solo, emissões de CO2</a:t>
+            <a:t> - </a:t>
+          </a:r>
+          <a:r>
+            <a:rPr lang="pt-PT" sz="1400" b="1" kern="1200" dirty="0"/>
+            <a:t>Poluição:</a:t>
+          </a:r>
+          <a:r>
+            <a:rPr lang="pt-PT" sz="1400" kern="1200" dirty="0"/>
+            <a:t> desperdício, contaminações do solo, emissões de CO2</a:t>
           </a:r>
         </a:p>
         <a:p>
@@ -1820,28 +2009,130 @@
           </a:br>
           <a:r>
             <a:rPr lang="pt-PT" sz="1400" kern="1200" dirty="0"/>
-            <a:t> - Recursos Consumidos: combustíveis</a:t>
+            <a:t> - </a:t>
+          </a:r>
+          <a:r>
+            <a:rPr lang="pt-PT" sz="1400" b="1" kern="1200" dirty="0" err="1"/>
+            <a:t>origem_percurso</a:t>
+          </a:r>
+          <a:r>
+            <a:rPr lang="pt-PT" sz="1400" b="1" kern="1200" dirty="0"/>
+            <a:t>: </a:t>
+          </a:r>
+          <a:r>
+            <a:rPr lang="pt-PT" sz="1400" kern="1200" dirty="0" err="1"/>
+            <a:t>string</a:t>
+          </a:r>
+          <a:r>
+            <a:rPr lang="pt-PT" sz="1400" kern="1200" dirty="0"/>
+            <a:t>. Recebe os nomes das localizações de origem (fornecedores) a partir do </a:t>
+          </a:r>
+          <a:r>
+            <a:rPr lang="pt-PT" sz="1400" kern="1200" dirty="0" err="1"/>
+            <a:t>csv</a:t>
+          </a:r>
+          <a:r>
+            <a:rPr lang="pt-PT" sz="1400" kern="1200" dirty="0"/>
+            <a:t>.</a:t>
           </a:r>
           <a:br>
             <a:rPr lang="pt-PT" sz="1400" kern="1200" dirty="0"/>
           </a:br>
           <a:r>
             <a:rPr lang="pt-PT" sz="1400" kern="1200" dirty="0"/>
-            <a:t> - Poluição: Emissões de CO2</a:t>
+            <a:t> </a:t>
+          </a:r>
+          <a:r>
+            <a:rPr lang="pt-PT" sz="1400" b="1" kern="1200" dirty="0"/>
+            <a:t>- transportadora: </a:t>
+          </a:r>
+          <a:r>
+            <a:rPr lang="pt-PT" sz="1400" kern="1200" dirty="0" err="1"/>
+            <a:t>string</a:t>
+          </a:r>
+          <a:r>
+            <a:rPr lang="pt-PT" sz="1400" kern="1200" dirty="0"/>
+            <a:t>. Recebe uma letra correspondente a cada transportadora.</a:t>
           </a:r>
           <a:br>
             <a:rPr lang="pt-PT" sz="1400" kern="1200" dirty="0"/>
           </a:br>
           <a:r>
             <a:rPr lang="pt-PT" sz="1400" kern="1200" dirty="0"/>
-            <a:t> - Localização: produção / Transportadora</a:t>
+            <a:t> </a:t>
+          </a:r>
+          <a:r>
+            <a:rPr lang="pt-PT" sz="1400" b="1" kern="1200" dirty="0"/>
+            <a:t>- chave: </a:t>
+          </a:r>
+          <a:r>
+            <a:rPr lang="pt-PT" sz="1400" kern="1200" dirty="0"/>
+            <a:t>combina a origem com a transportadora, para fazer a soma das pontuações.</a:t>
           </a:r>
           <a:br>
             <a:rPr lang="pt-PT" sz="1400" kern="1200" dirty="0"/>
           </a:br>
           <a:r>
             <a:rPr lang="pt-PT" sz="1400" kern="1200" dirty="0"/>
-            <a:t> - Destino: Colombo</a:t>
+            <a:t> </a:t>
+          </a:r>
+          <a:r>
+            <a:rPr lang="pt-PT" sz="1400" b="1" kern="1200" dirty="0"/>
+            <a:t>- </a:t>
+          </a:r>
+          <a:r>
+            <a:rPr lang="pt-PT" sz="1400" b="1" kern="1200" dirty="0" err="1"/>
+            <a:t>pontuação_total</a:t>
+          </a:r>
+          <a:r>
+            <a:rPr lang="pt-PT" sz="1400" b="1" kern="1200" dirty="0"/>
+            <a:t>: </a:t>
+          </a:r>
+          <a:r>
+            <a:rPr lang="pt-PT" sz="1400" kern="1200" dirty="0" err="1"/>
+            <a:t>int</a:t>
+          </a:r>
+          <a:r>
+            <a:rPr lang="pt-PT" sz="1400" kern="1200" dirty="0"/>
+            <a:t>. Soma pontuações do combustível e das emissões.</a:t>
+          </a:r>
+        </a:p>
+        <a:p>
+          <a:pPr marL="228600" lvl="2" indent="-114300" algn="l" defTabSz="622300">
+            <a:lnSpc>
+              <a:spcPct val="90000"/>
+            </a:lnSpc>
+            <a:spcBef>
+              <a:spcPct val="0"/>
+            </a:spcBef>
+            <a:spcAft>
+              <a:spcPct val="15000"/>
+            </a:spcAft>
+            <a:buNone/>
+          </a:pPr>
+          <a:r>
+            <a:rPr lang="pt-PT" sz="1400" kern="1200" dirty="0"/>
+            <a:t> </a:t>
+          </a:r>
+          <a:r>
+            <a:rPr lang="pt-PT" sz="1400" b="1" kern="1200" dirty="0"/>
+            <a:t>- </a:t>
+          </a:r>
+          <a:r>
+            <a:rPr lang="pt-PT" sz="1400" b="1" kern="1200" dirty="0" err="1"/>
+            <a:t>pontuacoes_por_transportadora_origem</a:t>
+          </a:r>
+          <a:r>
+            <a:rPr lang="pt-PT" sz="1400" b="1" kern="1200" dirty="0"/>
+            <a:t>: </a:t>
+          </a:r>
+          <a:r>
+            <a:rPr lang="pt-PT" sz="1400" kern="1200" dirty="0" err="1"/>
+            <a:t>int</a:t>
+          </a:r>
+          <a:r>
+            <a:rPr lang="pt-PT" sz="1400" kern="1200" dirty="0"/>
+            <a:t>. Soma das pontuações por origem/transportadora.</a:t>
           </a:r>
         </a:p>
         <a:p>
@@ -2057,14 +2348,30 @@
           </a:br>
           <a:r>
             <a:rPr lang="pt-PT" sz="1400" kern="1200" dirty="0"/>
-            <a:t> - Encomenda: por produto e quantidades diferentes à escolha do consumidor</a:t>
+            <a:t> - </a:t>
+          </a:r>
+          <a:r>
+            <a:rPr lang="pt-PT" sz="1400" b="1" kern="1200" dirty="0"/>
+            <a:t>Encomenda: </a:t>
+          </a:r>
+          <a:r>
+            <a:rPr lang="pt-PT" sz="1400" kern="1200" dirty="0"/>
+            <a:t>por produto e quantidades diferentes à escolha do consumidor</a:t>
           </a:r>
           <a:br>
             <a:rPr lang="pt-PT" sz="1400" kern="1200" dirty="0"/>
           </a:br>
           <a:r>
             <a:rPr lang="pt-PT" sz="1400" kern="1200" dirty="0"/>
-            <a:t> - Histórico: ser possível aceder ao histórico de recursos consumidos e poluição</a:t>
+            <a:t> - </a:t>
+          </a:r>
+          <a:r>
+            <a:rPr lang="pt-PT" sz="1400" b="1" kern="1200" dirty="0"/>
+            <a:t>Histórico: </a:t>
+          </a:r>
+          <a:r>
+            <a:rPr lang="pt-PT" sz="1400" kern="1200" dirty="0"/>
+            <a:t>ser possível aceder ao histórico de recursos consumidos e poluição</a:t>
           </a:r>
         </a:p>
       </dsp:txBody>
@@ -3514,7 +3821,7 @@
           <a:p>
             <a:fld id="{D6AFFFE6-4672-49D7-AF2D-526308249928}" type="datetimeFigureOut">
               <a:rPr lang="pt-PT" smtClean="0"/>
-              <a:t>06/03/2025</a:t>
+              <a:t>09/03/2025</a:t>
             </a:fld>
             <a:endParaRPr lang="pt-PT"/>
           </a:p>
@@ -3712,7 +4019,7 @@
           <a:p>
             <a:fld id="{D6AFFFE6-4672-49D7-AF2D-526308249928}" type="datetimeFigureOut">
               <a:rPr lang="pt-PT" smtClean="0"/>
-              <a:t>06/03/2025</a:t>
+              <a:t>09/03/2025</a:t>
             </a:fld>
             <a:endParaRPr lang="pt-PT"/>
           </a:p>
@@ -3920,7 +4227,7 @@
           <a:p>
             <a:fld id="{D6AFFFE6-4672-49D7-AF2D-526308249928}" type="datetimeFigureOut">
               <a:rPr lang="pt-PT" smtClean="0"/>
-              <a:t>06/03/2025</a:t>
+              <a:t>09/03/2025</a:t>
             </a:fld>
             <a:endParaRPr lang="pt-PT"/>
           </a:p>
@@ -4118,7 +4425,7 @@
           <a:p>
             <a:fld id="{D6AFFFE6-4672-49D7-AF2D-526308249928}" type="datetimeFigureOut">
               <a:rPr lang="pt-PT" smtClean="0"/>
-              <a:t>06/03/2025</a:t>
+              <a:t>09/03/2025</a:t>
             </a:fld>
             <a:endParaRPr lang="pt-PT"/>
           </a:p>
@@ -4393,7 +4700,7 @@
           <a:p>
             <a:fld id="{D6AFFFE6-4672-49D7-AF2D-526308249928}" type="datetimeFigureOut">
               <a:rPr lang="pt-PT" smtClean="0"/>
-              <a:t>06/03/2025</a:t>
+              <a:t>09/03/2025</a:t>
             </a:fld>
             <a:endParaRPr lang="pt-PT"/>
           </a:p>
@@ -4658,7 +4965,7 @@
           <a:p>
             <a:fld id="{D6AFFFE6-4672-49D7-AF2D-526308249928}" type="datetimeFigureOut">
               <a:rPr lang="pt-PT" smtClean="0"/>
-              <a:t>06/03/2025</a:t>
+              <a:t>09/03/2025</a:t>
             </a:fld>
             <a:endParaRPr lang="pt-PT"/>
           </a:p>
@@ -5070,7 +5377,7 @@
           <a:p>
             <a:fld id="{D6AFFFE6-4672-49D7-AF2D-526308249928}" type="datetimeFigureOut">
               <a:rPr lang="pt-PT" smtClean="0"/>
-              <a:t>06/03/2025</a:t>
+              <a:t>09/03/2025</a:t>
             </a:fld>
             <a:endParaRPr lang="pt-PT"/>
           </a:p>
@@ -5211,7 +5518,7 @@
           <a:p>
             <a:fld id="{D6AFFFE6-4672-49D7-AF2D-526308249928}" type="datetimeFigureOut">
               <a:rPr lang="pt-PT" smtClean="0"/>
-              <a:t>06/03/2025</a:t>
+              <a:t>09/03/2025</a:t>
             </a:fld>
             <a:endParaRPr lang="pt-PT"/>
           </a:p>
@@ -5324,7 +5631,7 @@
           <a:p>
             <a:fld id="{D6AFFFE6-4672-49D7-AF2D-526308249928}" type="datetimeFigureOut">
               <a:rPr lang="pt-PT" smtClean="0"/>
-              <a:t>06/03/2025</a:t>
+              <a:t>09/03/2025</a:t>
             </a:fld>
             <a:endParaRPr lang="pt-PT"/>
           </a:p>
@@ -5635,7 +5942,7 @@
           <a:p>
             <a:fld id="{D6AFFFE6-4672-49D7-AF2D-526308249928}" type="datetimeFigureOut">
               <a:rPr lang="pt-PT" smtClean="0"/>
-              <a:t>06/03/2025</a:t>
+              <a:t>09/03/2025</a:t>
             </a:fld>
             <a:endParaRPr lang="pt-PT"/>
           </a:p>
@@ -5923,7 +6230,7 @@
           <a:p>
             <a:fld id="{D6AFFFE6-4672-49D7-AF2D-526308249928}" type="datetimeFigureOut">
               <a:rPr lang="pt-PT" smtClean="0"/>
-              <a:t>06/03/2025</a:t>
+              <a:t>09/03/2025</a:t>
             </a:fld>
             <a:endParaRPr lang="pt-PT"/>
           </a:p>
@@ -6164,7 +6471,7 @@
           <a:p>
             <a:fld id="{D6AFFFE6-4672-49D7-AF2D-526308249928}" type="datetimeFigureOut">
               <a:rPr lang="pt-PT" smtClean="0"/>
-              <a:t>06/03/2025</a:t>
+              <a:t>09/03/2025</a:t>
             </a:fld>
             <a:endParaRPr lang="pt-PT"/>
           </a:p>
@@ -9023,7 +9330,7 @@
           <p:nvPr>
             <p:extLst>
               <p:ext uri="{D42A27DB-BD31-4B8C-83A1-F6EECF244321}">
-                <p14:modId xmlns:p14="http://schemas.microsoft.com/office/powerpoint/2010/main" val="3295123048"/>
+                <p14:modId xmlns:p14="http://schemas.microsoft.com/office/powerpoint/2010/main" val="3351416922"/>
               </p:ext>
             </p:extLst>
           </p:nvPr>
@@ -9092,7 +9399,13 @@
   <p:cSld>
     <p:spTree>
       <p:nvGrpSpPr>
-        <p:cNvPr id="1" name=""/>
+        <p:cNvPr id="1" name="">
+          <a:extLst>
+            <a:ext uri="{FF2B5EF4-FFF2-40B4-BE49-F238E27FC236}">
+              <a16:creationId xmlns:a16="http://schemas.microsoft.com/office/drawing/2014/main" id="{CA7DDCAF-CE4A-18AE-BC1A-AD6CF06E6C31}"/>
+            </a:ext>
+          </a:extLst>
+        </p:cNvPr>
         <p:cNvGrpSpPr/>
         <p:nvPr/>
       </p:nvGrpSpPr>
@@ -9109,7 +9422,7 @@
           <p:cNvPr id="4" name="CaixaDeTexto 3">
             <a:extLst>
               <a:ext uri="{FF2B5EF4-FFF2-40B4-BE49-F238E27FC236}">
-                <a16:creationId xmlns:a16="http://schemas.microsoft.com/office/drawing/2014/main" id="{3ECEB6D3-67FC-454B-9C83-95126096B8F7}"/>
+                <a16:creationId xmlns:a16="http://schemas.microsoft.com/office/drawing/2014/main" id="{6DE20A09-26A5-7CA8-D623-601F976167C7}"/>
               </a:ext>
             </a:extLst>
           </p:cNvPr>
@@ -9145,7 +9458,7 @@
           <p:cNvPr id="6" name="CaixaDeTexto 5">
             <a:extLst>
               <a:ext uri="{FF2B5EF4-FFF2-40B4-BE49-F238E27FC236}">
-                <a16:creationId xmlns:a16="http://schemas.microsoft.com/office/drawing/2014/main" id="{6E3F8FD3-4682-48BE-940C-DCA4FCB958BC}"/>
+                <a16:creationId xmlns:a16="http://schemas.microsoft.com/office/drawing/2014/main" id="{D83880DB-C597-5C07-5965-7B77FC047F38}"/>
               </a:ext>
             </a:extLst>
           </p:cNvPr>
@@ -9154,8 +9467,8 @@
         </p:nvSpPr>
         <p:spPr>
           <a:xfrm>
-            <a:off x="1617214" y="1951672"/>
-            <a:ext cx="8957569" cy="1477328"/>
+            <a:off x="641445" y="1112160"/>
+            <a:ext cx="10904561" cy="5678478"/>
           </a:xfrm>
           <a:prstGeom prst="rect">
             <a:avLst/>
@@ -9168,32 +9481,322 @@
           </a:bodyPr>
           <a:lstStyle/>
           <a:p>
-            <a:r>
-              <a:rPr lang="pt-PT" dirty="0"/>
-              <a:t>- </a:t>
-            </a:r>
-            <a:r>
-              <a:rPr lang="pt-PT" dirty="0">
+            <a:pPr marL="285750" indent="-285750">
+              <a:buFontTx/>
+              <a:buChar char="-"/>
+            </a:pPr>
+            <a:r>
+              <a:rPr lang="pt-PT" sz="1700" dirty="0" err="1"/>
+              <a:t>Supply</a:t>
+            </a:r>
+            <a:r>
+              <a:rPr lang="pt-PT" sz="1700" dirty="0"/>
+              <a:t> </a:t>
+            </a:r>
+            <a:r>
+              <a:rPr lang="pt-PT" sz="1700" dirty="0" err="1"/>
+              <a:t>Chain</a:t>
+            </a:r>
+            <a:r>
+              <a:rPr lang="pt-PT" sz="1700" dirty="0"/>
+              <a:t> </a:t>
+            </a:r>
+            <a:r>
+              <a:rPr lang="pt-PT" sz="1700" dirty="0" err="1"/>
+              <a:t>Sustainability</a:t>
+            </a:r>
+            <a:r>
+              <a:rPr lang="pt-PT" sz="1700" dirty="0"/>
+              <a:t>: </a:t>
+            </a:r>
+            <a:r>
+              <a:rPr lang="pt-PT" sz="1700" dirty="0">
                 <a:hlinkClick r:id="rId2"/>
               </a:rPr>
               <a:t>https://github.com/samirsaci/supply-chain-sustainability?tab=readme-ov-file</a:t>
             </a:r>
             <a:r>
-              <a:rPr lang="pt-PT" dirty="0"/>
-              <a:t> 05/03/2025</a:t>
-            </a:r>
-          </a:p>
-          <a:p>
-            <a:r>
-              <a:rPr lang="pt-PT" dirty="0"/>
-              <a:t>-</a:t>
-            </a:r>
-          </a:p>
-          <a:p>
-            <a:r>
-              <a:rPr lang="pt-PT" dirty="0"/>
-              <a:t>-</a:t>
-            </a:r>
+              <a:rPr lang="pt-PT" sz="1700" dirty="0"/>
+              <a:t> | 05/03/2024</a:t>
+            </a:r>
+          </a:p>
+          <a:p>
+            <a:pPr marL="285750" indent="-285750">
+              <a:buFontTx/>
+              <a:buChar char="-"/>
+            </a:pPr>
+            <a:r>
+              <a:rPr lang="pt-PT" sz="1700" dirty="0" err="1"/>
+              <a:t>Combustiveis</a:t>
+            </a:r>
+            <a:r>
+              <a:rPr lang="pt-PT" sz="1700" dirty="0"/>
+              <a:t>: </a:t>
+            </a:r>
+            <a:r>
+              <a:rPr lang="pt-PT" sz="1700" dirty="0">
+                <a:hlinkClick r:id="rId3"/>
+              </a:rPr>
+              <a:t>https://www.agriscitech.eu/wp-content/uploads/2021/03/7_AST_1_March_2021.pdf</a:t>
+            </a:r>
+            <a:r>
+              <a:rPr lang="pt-PT" sz="1700" dirty="0"/>
+              <a:t> | 06/03/2025</a:t>
+            </a:r>
+          </a:p>
+          <a:p>
+            <a:pPr marL="285750" indent="-285750">
+              <a:buFontTx/>
+              <a:buChar char="-"/>
+            </a:pPr>
+            <a:r>
+              <a:rPr lang="pt-PT" sz="1700" dirty="0"/>
+              <a:t>Poluição do solo: </a:t>
+            </a:r>
+            <a:r>
+              <a:rPr lang="pt-PT" sz="1700" dirty="0">
+                <a:hlinkClick r:id="rId4"/>
+              </a:rPr>
+              <a:t>https://www.pjoes.com/pdf-87554-21413?filename=21413.pdf</a:t>
+            </a:r>
+            <a:r>
+              <a:rPr lang="pt-PT" sz="1700" dirty="0"/>
+              <a:t> | 06/03/2025</a:t>
+            </a:r>
+          </a:p>
+          <a:p>
+            <a:pPr marL="285750" indent="-285750">
+              <a:buFontTx/>
+              <a:buChar char="-"/>
+            </a:pPr>
+            <a:r>
+              <a:rPr lang="pt-PT" sz="1700" dirty="0"/>
+              <a:t>C02: </a:t>
+            </a:r>
+            <a:r>
+              <a:rPr lang="pt-PT" sz="1700" dirty="0">
+                <a:hlinkClick r:id="rId5"/>
+              </a:rPr>
+              <a:t>https://www.sciencedirect.com/science/article/pii/S0269749112003600</a:t>
+            </a:r>
+            <a:r>
+              <a:rPr lang="pt-PT" sz="1700" dirty="0"/>
+              <a:t> | 06/03/2025</a:t>
+            </a:r>
+          </a:p>
+          <a:p>
+            <a:pPr marL="285750" indent="-285750">
+              <a:buFontTx/>
+              <a:buChar char="-"/>
+            </a:pPr>
+            <a:r>
+              <a:rPr lang="pt-PT" sz="1700" dirty="0"/>
+              <a:t>Agua: </a:t>
+            </a:r>
+            <a:r>
+              <a:rPr lang="pt-PT" sz="1700" dirty="0">
+                <a:hlinkClick r:id="rId6"/>
+              </a:rPr>
+              <a:t>https://www.nature.com/articles/s41597-024-03051-3</a:t>
+            </a:r>
+            <a:r>
+              <a:rPr lang="pt-PT" sz="1700" dirty="0"/>
+              <a:t> | 06/03/2025</a:t>
+            </a:r>
+          </a:p>
+          <a:p>
+            <a:pPr marL="285750" indent="-285750">
+              <a:buFontTx/>
+              <a:buChar char="-"/>
+            </a:pPr>
+            <a:r>
+              <a:rPr lang="pt-PT" sz="1700" dirty="0"/>
+              <a:t>Desperdício alimentar: </a:t>
+            </a:r>
+            <a:r>
+              <a:rPr lang="pt-PT" sz="1700" dirty="0">
+                <a:hlinkClick r:id="rId7"/>
+              </a:rPr>
+              <a:t>https://publications.jrc.ec.europa.eu/repository/handle/JRC96121</a:t>
+            </a:r>
+            <a:r>
+              <a:rPr lang="pt-PT" sz="1700" dirty="0"/>
+              <a:t> | 06/03/2025</a:t>
+            </a:r>
+          </a:p>
+          <a:p>
+            <a:pPr marL="285750" indent="-285750">
+              <a:buFontTx/>
+              <a:buChar char="-"/>
+            </a:pPr>
+            <a:r>
+              <a:rPr lang="pt-PT" sz="1700" dirty="0"/>
+              <a:t>Eletricidade: enunciado  | 06/03/2025</a:t>
+            </a:r>
+          </a:p>
+          <a:p>
+            <a:pPr marL="285750" indent="-285750">
+              <a:buFontTx/>
+              <a:buChar char="-"/>
+            </a:pPr>
+            <a:r>
+              <a:rPr lang="pt-PT" sz="1700" dirty="0"/>
+              <a:t>Contaminação do solo: </a:t>
+            </a:r>
+            <a:r>
+              <a:rPr lang="pt-PT" sz="1700" dirty="0">
+                <a:hlinkClick r:id="rId4"/>
+              </a:rPr>
+              <a:t>https://www.pjoes.com/pdf-87554-21413?filename=21413.pdf</a:t>
+            </a:r>
+            <a:r>
+              <a:rPr lang="pt-PT" sz="1700" dirty="0"/>
+              <a:t> | 06/03/2025</a:t>
+            </a:r>
+          </a:p>
+          <a:p>
+            <a:pPr marL="285750" indent="-285750">
+              <a:buFontTx/>
+              <a:buChar char="-"/>
+            </a:pPr>
+            <a:r>
+              <a:rPr lang="pt-PT" sz="1700" dirty="0"/>
+              <a:t>Consumo Combustível Camiões: </a:t>
+            </a:r>
+            <a:r>
+              <a:rPr lang="pt-PT" sz="1700" dirty="0">
+                <a:hlinkClick r:id="rId8"/>
+              </a:rPr>
+              <a:t>https://prologapp.com/blog/consumo-de-combustivel-de-caminhoes/</a:t>
+            </a:r>
+            <a:r>
+              <a:rPr lang="pt-PT" sz="1700" dirty="0"/>
+              <a:t> | 07/03/2025</a:t>
+            </a:r>
+          </a:p>
+          <a:p>
+            <a:pPr marL="285750" indent="-285750">
+              <a:buFontTx/>
+              <a:buChar char="-"/>
+            </a:pPr>
+            <a:r>
+              <a:rPr lang="pt-PT" sz="1700" dirty="0"/>
+              <a:t>Transporte de Mercadorias: </a:t>
+            </a:r>
+            <a:r>
+              <a:rPr lang="pt-PT" sz="1700" dirty="0">
+                <a:hlinkClick r:id="rId9"/>
+              </a:rPr>
+              <a:t>https://rea.apambiente.pt/content/transporte-de-mercadorias</a:t>
+            </a:r>
+            <a:r>
+              <a:rPr lang="pt-PT" sz="1700" dirty="0"/>
+              <a:t> | 07/03/2025</a:t>
+            </a:r>
+          </a:p>
+          <a:p>
+            <a:pPr marL="285750" indent="-285750">
+              <a:buFontTx/>
+              <a:buChar char="-"/>
+            </a:pPr>
+            <a:r>
+              <a:rPr lang="pt-PT" sz="1700" dirty="0"/>
+              <a:t>Preço dos Combustíveis: </a:t>
+            </a:r>
+            <a:r>
+              <a:rPr lang="pt-PT" sz="1700" dirty="0">
+                <a:hlinkClick r:id="rId10"/>
+              </a:rPr>
+              <a:t>https://precoscombustiveis.dgeg.gov.pt/estatistica/preco-medio-diario/</a:t>
+            </a:r>
+            <a:r>
+              <a:rPr lang="pt-PT" sz="1700" dirty="0"/>
+              <a:t> | 07/03/2025</a:t>
+            </a:r>
+          </a:p>
+          <a:p>
+            <a:pPr marL="285750" indent="-285750">
+              <a:buFontTx/>
+              <a:buChar char="-"/>
+            </a:pPr>
+            <a:r>
+              <a:rPr lang="pt-PT" sz="1700" dirty="0"/>
+              <a:t>Consumo CO2: </a:t>
+            </a:r>
+            <a:r>
+              <a:rPr lang="pt-PT" sz="1700" dirty="0">
+                <a:hlinkClick r:id="rId11"/>
+              </a:rPr>
+              <a:t>https://gasogenio.com/pt/blog/emissoes-de-co2-por-tipo-de-combustivel/</a:t>
+            </a:r>
+            <a:r>
+              <a:rPr lang="pt-PT" sz="1700" dirty="0"/>
+              <a:t> | 07/03/2025</a:t>
+            </a:r>
+          </a:p>
+          <a:p>
+            <a:pPr marL="285750" indent="-285750">
+              <a:buFontTx/>
+              <a:buChar char="-"/>
+            </a:pPr>
+            <a:r>
+              <a:rPr lang="pt-PT" sz="1700" dirty="0" err="1"/>
+              <a:t>Logistics</a:t>
+            </a:r>
+            <a:r>
+              <a:rPr lang="pt-PT" sz="1700" dirty="0"/>
+              <a:t> </a:t>
+            </a:r>
+            <a:r>
+              <a:rPr lang="pt-PT" sz="1700" dirty="0" err="1"/>
+              <a:t>Operations</a:t>
+            </a:r>
+            <a:r>
+              <a:rPr lang="pt-PT" sz="1700" dirty="0"/>
+              <a:t> </a:t>
+            </a:r>
+            <a:r>
+              <a:rPr lang="pt-PT" sz="1700" dirty="0" err="1"/>
+              <a:t>and</a:t>
+            </a:r>
+            <a:r>
+              <a:rPr lang="pt-PT" sz="1700" dirty="0"/>
+              <a:t> Management: </a:t>
+            </a:r>
+            <a:r>
+              <a:rPr lang="pt-PT" sz="1700" dirty="0">
+                <a:hlinkClick r:id="rId12"/>
+              </a:rPr>
+              <a:t>https://ftp.idu.ac.id/wp-content/uploads/ebook/ip/LOGISTIK%20OPERASI/epdf.pub_logistics-operations-and-management-concepts-and-m.pdf</a:t>
+            </a:r>
+            <a:r>
+              <a:rPr lang="pt-PT" sz="1700" dirty="0"/>
+              <a:t> | 07/03/2025</a:t>
+            </a:r>
+          </a:p>
+          <a:p>
+            <a:pPr marL="285750" indent="-285750">
+              <a:buFontTx/>
+              <a:buChar char="-"/>
+            </a:pPr>
+            <a:endParaRPr lang="pt-PT" dirty="0"/>
+          </a:p>
+          <a:p>
+            <a:pPr marL="285750" indent="-285750">
+              <a:buFontTx/>
+              <a:buChar char="-"/>
+            </a:pPr>
+            <a:endParaRPr lang="pt-PT" dirty="0"/>
+          </a:p>
+          <a:p>
+            <a:pPr marL="285750" indent="-285750">
+              <a:buFontTx/>
+              <a:buChar char="-"/>
+            </a:pPr>
+            <a:endParaRPr lang="pt-PT" dirty="0"/>
+          </a:p>
+          <a:p>
+            <a:endParaRPr lang="pt-PT" dirty="0"/>
           </a:p>
           <a:p>
             <a:endParaRPr lang="pt-PT" dirty="0"/>
@@ -9206,7 +9809,7 @@
     </p:spTree>
     <p:extLst>
       <p:ext uri="{BB962C8B-B14F-4D97-AF65-F5344CB8AC3E}">
-        <p14:creationId xmlns:p14="http://schemas.microsoft.com/office/powerpoint/2010/main" val="1023581901"/>
+        <p14:creationId xmlns:p14="http://schemas.microsoft.com/office/powerpoint/2010/main" val="2597916564"/>
       </p:ext>
     </p:extLst>
   </p:cSld>

</xml_diff>